<commit_message>
Updated Document in local branch
</commit_message>
<xml_diff>
--- a/Selenium.pptx
+++ b/Selenium.pptx
@@ -108,6 +108,11 @@
       </a:defRPr>
     </a:lvl9pPr>
   </p:defaultTextStyle>
+  <p:extLst>
+    <p:ext uri="{EFAFB233-063F-42B5-8137-9DF3F51BA10A}">
+      <p15:sldGuideLst xmlns:p15="http://schemas.microsoft.com/office/powerpoint/2012/main"/>
+    </p:ext>
+  </p:extLst>
 </p:presentation>
 </file>
 
@@ -1001,7 +1006,7 @@
           <a:p>
             <a:fld id="{CE3C2E0B-7B68-4022-B8D4-9A9E04BB8B1F}" type="datetimeFigureOut">
               <a:rPr lang="en-GB" smtClean="0"/>
-              <a:t>11/02/2023</a:t>
+              <a:t>19/02/2023</a:t>
             </a:fld>
             <a:endParaRPr lang="en-GB"/>
           </a:p>
@@ -1252,7 +1257,7 @@
           <a:p>
             <a:fld id="{CE3C2E0B-7B68-4022-B8D4-9A9E04BB8B1F}" type="datetimeFigureOut">
               <a:rPr lang="en-GB" smtClean="0"/>
-              <a:t>11/02/2023</a:t>
+              <a:t>19/02/2023</a:t>
             </a:fld>
             <a:endParaRPr lang="en-GB"/>
           </a:p>
@@ -1566,7 +1571,7 @@
           <a:p>
             <a:fld id="{CE3C2E0B-7B68-4022-B8D4-9A9E04BB8B1F}" type="datetimeFigureOut">
               <a:rPr lang="en-GB" smtClean="0"/>
-              <a:t>11/02/2023</a:t>
+              <a:t>19/02/2023</a:t>
             </a:fld>
             <a:endParaRPr lang="en-GB"/>
           </a:p>
@@ -1907,7 +1912,7 @@
           <a:p>
             <a:fld id="{CE3C2E0B-7B68-4022-B8D4-9A9E04BB8B1F}" type="datetimeFigureOut">
               <a:rPr lang="en-GB" smtClean="0"/>
-              <a:t>11/02/2023</a:t>
+              <a:t>19/02/2023</a:t>
             </a:fld>
             <a:endParaRPr lang="en-GB"/>
           </a:p>
@@ -2221,7 +2226,7 @@
           <a:p>
             <a:fld id="{CE3C2E0B-7B68-4022-B8D4-9A9E04BB8B1F}" type="datetimeFigureOut">
               <a:rPr lang="en-GB" smtClean="0"/>
-              <a:t>11/02/2023</a:t>
+              <a:t>19/02/2023</a:t>
             </a:fld>
             <a:endParaRPr lang="en-GB"/>
           </a:p>
@@ -2614,7 +2619,7 @@
           <a:p>
             <a:fld id="{CE3C2E0B-7B68-4022-B8D4-9A9E04BB8B1F}" type="datetimeFigureOut">
               <a:rPr lang="en-GB" smtClean="0"/>
-              <a:t>11/02/2023</a:t>
+              <a:t>19/02/2023</a:t>
             </a:fld>
             <a:endParaRPr lang="en-GB"/>
           </a:p>
@@ -2784,7 +2789,7 @@
           <a:p>
             <a:fld id="{CE3C2E0B-7B68-4022-B8D4-9A9E04BB8B1F}" type="datetimeFigureOut">
               <a:rPr lang="en-GB" smtClean="0"/>
-              <a:t>11/02/2023</a:t>
+              <a:t>19/02/2023</a:t>
             </a:fld>
             <a:endParaRPr lang="en-GB"/>
           </a:p>
@@ -2964,7 +2969,7 @@
           <a:p>
             <a:fld id="{CE3C2E0B-7B68-4022-B8D4-9A9E04BB8B1F}" type="datetimeFigureOut">
               <a:rPr lang="en-GB" smtClean="0"/>
-              <a:t>11/02/2023</a:t>
+              <a:t>19/02/2023</a:t>
             </a:fld>
             <a:endParaRPr lang="en-GB"/>
           </a:p>
@@ -3140,7 +3145,7 @@
           <a:p>
             <a:fld id="{CE3C2E0B-7B68-4022-B8D4-9A9E04BB8B1F}" type="datetimeFigureOut">
               <a:rPr lang="en-GB" smtClean="0"/>
-              <a:t>11/02/2023</a:t>
+              <a:t>19/02/2023</a:t>
             </a:fld>
             <a:endParaRPr lang="en-GB"/>
           </a:p>
@@ -3387,7 +3392,7 @@
           <a:p>
             <a:fld id="{CE3C2E0B-7B68-4022-B8D4-9A9E04BB8B1F}" type="datetimeFigureOut">
               <a:rPr lang="en-GB" smtClean="0"/>
-              <a:t>11/02/2023</a:t>
+              <a:t>19/02/2023</a:t>
             </a:fld>
             <a:endParaRPr lang="en-GB"/>
           </a:p>
@@ -3619,7 +3624,7 @@
           <a:p>
             <a:fld id="{CE3C2E0B-7B68-4022-B8D4-9A9E04BB8B1F}" type="datetimeFigureOut">
               <a:rPr lang="en-GB" smtClean="0"/>
-              <a:t>11/02/2023</a:t>
+              <a:t>19/02/2023</a:t>
             </a:fld>
             <a:endParaRPr lang="en-GB"/>
           </a:p>
@@ -3993,7 +3998,7 @@
           <a:p>
             <a:fld id="{CE3C2E0B-7B68-4022-B8D4-9A9E04BB8B1F}" type="datetimeFigureOut">
               <a:rPr lang="en-GB" smtClean="0"/>
-              <a:t>11/02/2023</a:t>
+              <a:t>19/02/2023</a:t>
             </a:fld>
             <a:endParaRPr lang="en-GB"/>
           </a:p>
@@ -4116,7 +4121,7 @@
           <a:p>
             <a:fld id="{CE3C2E0B-7B68-4022-B8D4-9A9E04BB8B1F}" type="datetimeFigureOut">
               <a:rPr lang="en-GB" smtClean="0"/>
-              <a:t>11/02/2023</a:t>
+              <a:t>19/02/2023</a:t>
             </a:fld>
             <a:endParaRPr lang="en-GB"/>
           </a:p>
@@ -4211,7 +4216,7 @@
           <a:p>
             <a:fld id="{CE3C2E0B-7B68-4022-B8D4-9A9E04BB8B1F}" type="datetimeFigureOut">
               <a:rPr lang="en-GB" smtClean="0"/>
-              <a:t>11/02/2023</a:t>
+              <a:t>19/02/2023</a:t>
             </a:fld>
             <a:endParaRPr lang="en-GB"/>
           </a:p>
@@ -4466,7 +4471,7 @@
           <a:p>
             <a:fld id="{CE3C2E0B-7B68-4022-B8D4-9A9E04BB8B1F}" type="datetimeFigureOut">
               <a:rPr lang="en-GB" smtClean="0"/>
-              <a:t>11/02/2023</a:t>
+              <a:t>19/02/2023</a:t>
             </a:fld>
             <a:endParaRPr lang="en-GB"/>
           </a:p>
@@ -4729,7 +4734,7 @@
           <a:p>
             <a:fld id="{CE3C2E0B-7B68-4022-B8D4-9A9E04BB8B1F}" type="datetimeFigureOut">
               <a:rPr lang="en-GB" smtClean="0"/>
-              <a:t>11/02/2023</a:t>
+              <a:t>19/02/2023</a:t>
             </a:fld>
             <a:endParaRPr lang="en-GB"/>
           </a:p>
@@ -5472,7 +5477,7 @@
           <a:p>
             <a:fld id="{CE3C2E0B-7B68-4022-B8D4-9A9E04BB8B1F}" type="datetimeFigureOut">
               <a:rPr lang="en-GB" smtClean="0"/>
-              <a:t>11/02/2023</a:t>
+              <a:t>19/02/2023</a:t>
             </a:fld>
             <a:endParaRPr lang="en-GB"/>
           </a:p>
@@ -6019,7 +6024,7 @@
           <a:p>
             <a:r>
               <a:rPr lang="en-GB" dirty="0"/>
-              <a:t>Selenium</a:t>
+              <a:t>Selenium Automation Tool</a:t>
             </a:r>
           </a:p>
         </p:txBody>

</xml_diff>

<commit_message>
Updated Selenium kt document
</commit_message>
<xml_diff>
--- a/Selenium.pptx
+++ b/Selenium.pptx
@@ -7,9 +7,11 @@
   <p:sldIdLst>
     <p:sldId id="256" r:id="rId2"/>
     <p:sldId id="257" r:id="rId3"/>
-    <p:sldId id="258" r:id="rId4"/>
-    <p:sldId id="259" r:id="rId5"/>
-    <p:sldId id="260" r:id="rId6"/>
+    <p:sldId id="261" r:id="rId4"/>
+    <p:sldId id="258" r:id="rId5"/>
+    <p:sldId id="259" r:id="rId6"/>
+    <p:sldId id="260" r:id="rId7"/>
+    <p:sldId id="262" r:id="rId8"/>
   </p:sldIdLst>
   <p:sldSz cx="12192000" cy="6858000"/>
   <p:notesSz cx="6858000" cy="9144000"/>
@@ -118,6 +120,145 @@
 
 <file path=ppt/changesInfos/changesInfo1.xml><?xml version="1.0" encoding="utf-8"?>
 <pc:chgInfo xmlns:a="http://schemas.openxmlformats.org/drawingml/2006/main" xmlns:r="http://schemas.openxmlformats.org/officeDocument/2006/relationships" xmlns:ac="http://schemas.microsoft.com/office/drawing/2013/main/command" xmlns:pc="http://schemas.microsoft.com/office/powerpoint/2013/main/command">
+  <pc:docChgLst>
+    <pc:chgData name="Sukhdev Pal" userId="cc07184d843404f9" providerId="LiveId" clId="{1E18C202-FF7F-451B-B3FA-BB8C58F75A1A}"/>
+    <pc:docChg chg="undo custSel addSld modSld">
+      <pc:chgData name="Sukhdev Pal" userId="cc07184d843404f9" providerId="LiveId" clId="{1E18C202-FF7F-451B-B3FA-BB8C58F75A1A}" dt="2023-02-20T18:12:46.848" v="888"/>
+      <pc:docMkLst>
+        <pc:docMk/>
+      </pc:docMkLst>
+      <pc:sldChg chg="modSp mod">
+        <pc:chgData name="Sukhdev Pal" userId="cc07184d843404f9" providerId="LiveId" clId="{1E18C202-FF7F-451B-B3FA-BB8C58F75A1A}" dt="2023-02-20T17:27:32.824" v="156" actId="20577"/>
+        <pc:sldMkLst>
+          <pc:docMk/>
+          <pc:sldMk cId="4289163101" sldId="257"/>
+        </pc:sldMkLst>
+        <pc:spChg chg="mod">
+          <ac:chgData name="Sukhdev Pal" userId="cc07184d843404f9" providerId="LiveId" clId="{1E18C202-FF7F-451B-B3FA-BB8C58F75A1A}" dt="2023-02-20T17:27:32.824" v="156" actId="20577"/>
+          <ac:spMkLst>
+            <pc:docMk/>
+            <pc:sldMk cId="4289163101" sldId="257"/>
+            <ac:spMk id="2" creationId="{5F302912-3444-BFCB-4DD7-7240B4271F2E}"/>
+          </ac:spMkLst>
+        </pc:spChg>
+        <pc:picChg chg="mod">
+          <ac:chgData name="Sukhdev Pal" userId="cc07184d843404f9" providerId="LiveId" clId="{1E18C202-FF7F-451B-B3FA-BB8C58F75A1A}" dt="2023-02-20T17:27:28.997" v="155" actId="1076"/>
+          <ac:picMkLst>
+            <pc:docMk/>
+            <pc:sldMk cId="4289163101" sldId="257"/>
+            <ac:picMk id="5" creationId="{EDD981F5-AE92-A035-94E9-D65294EDC4CB}"/>
+          </ac:picMkLst>
+        </pc:picChg>
+      </pc:sldChg>
+      <pc:sldChg chg="modSp mod">
+        <pc:chgData name="Sukhdev Pal" userId="cc07184d843404f9" providerId="LiveId" clId="{1E18C202-FF7F-451B-B3FA-BB8C58F75A1A}" dt="2023-02-20T17:46:25.932" v="540" actId="20577"/>
+        <pc:sldMkLst>
+          <pc:docMk/>
+          <pc:sldMk cId="1022287705" sldId="258"/>
+        </pc:sldMkLst>
+        <pc:spChg chg="mod">
+          <ac:chgData name="Sukhdev Pal" userId="cc07184d843404f9" providerId="LiveId" clId="{1E18C202-FF7F-451B-B3FA-BB8C58F75A1A}" dt="2023-02-20T17:46:25.932" v="540" actId="20577"/>
+          <ac:spMkLst>
+            <pc:docMk/>
+            <pc:sldMk cId="1022287705" sldId="258"/>
+            <ac:spMk id="2" creationId="{5F302912-3444-BFCB-4DD7-7240B4271F2E}"/>
+          </ac:spMkLst>
+        </pc:spChg>
+      </pc:sldChg>
+      <pc:sldChg chg="modSp mod">
+        <pc:chgData name="Sukhdev Pal" userId="cc07184d843404f9" providerId="LiveId" clId="{1E18C202-FF7F-451B-B3FA-BB8C58F75A1A}" dt="2023-02-20T17:52:17.036" v="577" actId="14100"/>
+        <pc:sldMkLst>
+          <pc:docMk/>
+          <pc:sldMk cId="3803384798" sldId="259"/>
+        </pc:sldMkLst>
+        <pc:spChg chg="mod">
+          <ac:chgData name="Sukhdev Pal" userId="cc07184d843404f9" providerId="LiveId" clId="{1E18C202-FF7F-451B-B3FA-BB8C58F75A1A}" dt="2023-02-20T17:52:11.440" v="576" actId="20577"/>
+          <ac:spMkLst>
+            <pc:docMk/>
+            <pc:sldMk cId="3803384798" sldId="259"/>
+            <ac:spMk id="2" creationId="{5F302912-3444-BFCB-4DD7-7240B4271F2E}"/>
+          </ac:spMkLst>
+        </pc:spChg>
+        <pc:picChg chg="mod">
+          <ac:chgData name="Sukhdev Pal" userId="cc07184d843404f9" providerId="LiveId" clId="{1E18C202-FF7F-451B-B3FA-BB8C58F75A1A}" dt="2023-02-20T17:52:17.036" v="577" actId="14100"/>
+          <ac:picMkLst>
+            <pc:docMk/>
+            <pc:sldMk cId="3803384798" sldId="259"/>
+            <ac:picMk id="4" creationId="{CE20A5B8-6A94-8174-A56D-DD8D973338DE}"/>
+          </ac:picMkLst>
+        </pc:picChg>
+      </pc:sldChg>
+      <pc:sldChg chg="modSp mod">
+        <pc:chgData name="Sukhdev Pal" userId="cc07184d843404f9" providerId="LiveId" clId="{1E18C202-FF7F-451B-B3FA-BB8C58F75A1A}" dt="2023-02-20T18:01:40.805" v="590" actId="14734"/>
+        <pc:sldMkLst>
+          <pc:docMk/>
+          <pc:sldMk cId="4101074739" sldId="260"/>
+        </pc:sldMkLst>
+        <pc:spChg chg="mod">
+          <ac:chgData name="Sukhdev Pal" userId="cc07184d843404f9" providerId="LiveId" clId="{1E18C202-FF7F-451B-B3FA-BB8C58F75A1A}" dt="2023-02-20T17:59:38.266" v="589" actId="20577"/>
+          <ac:spMkLst>
+            <pc:docMk/>
+            <pc:sldMk cId="4101074739" sldId="260"/>
+            <ac:spMk id="2" creationId="{5F302912-3444-BFCB-4DD7-7240B4271F2E}"/>
+          </ac:spMkLst>
+        </pc:spChg>
+        <pc:graphicFrameChg chg="modGraphic">
+          <ac:chgData name="Sukhdev Pal" userId="cc07184d843404f9" providerId="LiveId" clId="{1E18C202-FF7F-451B-B3FA-BB8C58F75A1A}" dt="2023-02-20T18:01:40.805" v="590" actId="14734"/>
+          <ac:graphicFrameMkLst>
+            <pc:docMk/>
+            <pc:sldMk cId="4101074739" sldId="260"/>
+            <ac:graphicFrameMk id="6" creationId="{F3522622-4181-8018-7E65-2E71CD74F241}"/>
+          </ac:graphicFrameMkLst>
+        </pc:graphicFrameChg>
+      </pc:sldChg>
+      <pc:sldChg chg="delSp modSp add mod">
+        <pc:chgData name="Sukhdev Pal" userId="cc07184d843404f9" providerId="LiveId" clId="{1E18C202-FF7F-451B-B3FA-BB8C58F75A1A}" dt="2023-02-20T17:41:40.404" v="523" actId="20577"/>
+        <pc:sldMkLst>
+          <pc:docMk/>
+          <pc:sldMk cId="3855450844" sldId="261"/>
+        </pc:sldMkLst>
+        <pc:spChg chg="mod">
+          <ac:chgData name="Sukhdev Pal" userId="cc07184d843404f9" providerId="LiveId" clId="{1E18C202-FF7F-451B-B3FA-BB8C58F75A1A}" dt="2023-02-20T17:41:40.404" v="523" actId="20577"/>
+          <ac:spMkLst>
+            <pc:docMk/>
+            <pc:sldMk cId="3855450844" sldId="261"/>
+            <ac:spMk id="2" creationId="{5F302912-3444-BFCB-4DD7-7240B4271F2E}"/>
+          </ac:spMkLst>
+        </pc:spChg>
+        <pc:picChg chg="del">
+          <ac:chgData name="Sukhdev Pal" userId="cc07184d843404f9" providerId="LiveId" clId="{1E18C202-FF7F-451B-B3FA-BB8C58F75A1A}" dt="2023-02-20T17:34:42.299" v="158" actId="478"/>
+          <ac:picMkLst>
+            <pc:docMk/>
+            <pc:sldMk cId="3855450844" sldId="261"/>
+            <ac:picMk id="5" creationId="{EDD981F5-AE92-A035-94E9-D65294EDC4CB}"/>
+          </ac:picMkLst>
+        </pc:picChg>
+      </pc:sldChg>
+      <pc:sldChg chg="modSp add mod">
+        <pc:chgData name="Sukhdev Pal" userId="cc07184d843404f9" providerId="LiveId" clId="{1E18C202-FF7F-451B-B3FA-BB8C58F75A1A}" dt="2023-02-20T18:12:46.848" v="888"/>
+        <pc:sldMkLst>
+          <pc:docMk/>
+          <pc:sldMk cId="2461885617" sldId="262"/>
+        </pc:sldMkLst>
+        <pc:spChg chg="mod">
+          <ac:chgData name="Sukhdev Pal" userId="cc07184d843404f9" providerId="LiveId" clId="{1E18C202-FF7F-451B-B3FA-BB8C58F75A1A}" dt="2023-02-20T18:12:46.848" v="888"/>
+          <ac:spMkLst>
+            <pc:docMk/>
+            <pc:sldMk cId="2461885617" sldId="262"/>
+            <ac:spMk id="2" creationId="{5F302912-3444-BFCB-4DD7-7240B4271F2E}"/>
+          </ac:spMkLst>
+        </pc:spChg>
+        <pc:graphicFrameChg chg="modGraphic">
+          <ac:chgData name="Sukhdev Pal" userId="cc07184d843404f9" providerId="LiveId" clId="{1E18C202-FF7F-451B-B3FA-BB8C58F75A1A}" dt="2023-02-20T18:10:04.905" v="861" actId="14734"/>
+          <ac:graphicFrameMkLst>
+            <pc:docMk/>
+            <pc:sldMk cId="2461885617" sldId="262"/>
+            <ac:graphicFrameMk id="6" creationId="{F3522622-4181-8018-7E65-2E71CD74F241}"/>
+          </ac:graphicFrameMkLst>
+        </pc:graphicFrameChg>
+      </pc:sldChg>
+    </pc:docChg>
+  </pc:docChgLst>
   <pc:docChgLst>
     <pc:chgData name="Sukhdev Pal" userId="cc07184d843404f9" providerId="LiveId" clId="{F3074FE3-696F-4330-BF01-B2A4A0E78849}"/>
     <pc:docChg chg="undo custSel addSld delSld modSld">
@@ -1006,7 +1147,7 @@
           <a:p>
             <a:fld id="{CE3C2E0B-7B68-4022-B8D4-9A9E04BB8B1F}" type="datetimeFigureOut">
               <a:rPr lang="en-GB" smtClean="0"/>
-              <a:t>19/02/2023</a:t>
+              <a:t>20/02/2023</a:t>
             </a:fld>
             <a:endParaRPr lang="en-GB"/>
           </a:p>
@@ -1257,7 +1398,7 @@
           <a:p>
             <a:fld id="{CE3C2E0B-7B68-4022-B8D4-9A9E04BB8B1F}" type="datetimeFigureOut">
               <a:rPr lang="en-GB" smtClean="0"/>
-              <a:t>19/02/2023</a:t>
+              <a:t>20/02/2023</a:t>
             </a:fld>
             <a:endParaRPr lang="en-GB"/>
           </a:p>
@@ -1571,7 +1712,7 @@
           <a:p>
             <a:fld id="{CE3C2E0B-7B68-4022-B8D4-9A9E04BB8B1F}" type="datetimeFigureOut">
               <a:rPr lang="en-GB" smtClean="0"/>
-              <a:t>19/02/2023</a:t>
+              <a:t>20/02/2023</a:t>
             </a:fld>
             <a:endParaRPr lang="en-GB"/>
           </a:p>
@@ -1912,7 +2053,7 @@
           <a:p>
             <a:fld id="{CE3C2E0B-7B68-4022-B8D4-9A9E04BB8B1F}" type="datetimeFigureOut">
               <a:rPr lang="en-GB" smtClean="0"/>
-              <a:t>19/02/2023</a:t>
+              <a:t>20/02/2023</a:t>
             </a:fld>
             <a:endParaRPr lang="en-GB"/>
           </a:p>
@@ -2226,7 +2367,7 @@
           <a:p>
             <a:fld id="{CE3C2E0B-7B68-4022-B8D4-9A9E04BB8B1F}" type="datetimeFigureOut">
               <a:rPr lang="en-GB" smtClean="0"/>
-              <a:t>19/02/2023</a:t>
+              <a:t>20/02/2023</a:t>
             </a:fld>
             <a:endParaRPr lang="en-GB"/>
           </a:p>
@@ -2619,7 +2760,7 @@
           <a:p>
             <a:fld id="{CE3C2E0B-7B68-4022-B8D4-9A9E04BB8B1F}" type="datetimeFigureOut">
               <a:rPr lang="en-GB" smtClean="0"/>
-              <a:t>19/02/2023</a:t>
+              <a:t>20/02/2023</a:t>
             </a:fld>
             <a:endParaRPr lang="en-GB"/>
           </a:p>
@@ -2789,7 +2930,7 @@
           <a:p>
             <a:fld id="{CE3C2E0B-7B68-4022-B8D4-9A9E04BB8B1F}" type="datetimeFigureOut">
               <a:rPr lang="en-GB" smtClean="0"/>
-              <a:t>19/02/2023</a:t>
+              <a:t>20/02/2023</a:t>
             </a:fld>
             <a:endParaRPr lang="en-GB"/>
           </a:p>
@@ -2969,7 +3110,7 @@
           <a:p>
             <a:fld id="{CE3C2E0B-7B68-4022-B8D4-9A9E04BB8B1F}" type="datetimeFigureOut">
               <a:rPr lang="en-GB" smtClean="0"/>
-              <a:t>19/02/2023</a:t>
+              <a:t>20/02/2023</a:t>
             </a:fld>
             <a:endParaRPr lang="en-GB"/>
           </a:p>
@@ -3145,7 +3286,7 @@
           <a:p>
             <a:fld id="{CE3C2E0B-7B68-4022-B8D4-9A9E04BB8B1F}" type="datetimeFigureOut">
               <a:rPr lang="en-GB" smtClean="0"/>
-              <a:t>19/02/2023</a:t>
+              <a:t>20/02/2023</a:t>
             </a:fld>
             <a:endParaRPr lang="en-GB"/>
           </a:p>
@@ -3392,7 +3533,7 @@
           <a:p>
             <a:fld id="{CE3C2E0B-7B68-4022-B8D4-9A9E04BB8B1F}" type="datetimeFigureOut">
               <a:rPr lang="en-GB" smtClean="0"/>
-              <a:t>19/02/2023</a:t>
+              <a:t>20/02/2023</a:t>
             </a:fld>
             <a:endParaRPr lang="en-GB"/>
           </a:p>
@@ -3624,7 +3765,7 @@
           <a:p>
             <a:fld id="{CE3C2E0B-7B68-4022-B8D4-9A9E04BB8B1F}" type="datetimeFigureOut">
               <a:rPr lang="en-GB" smtClean="0"/>
-              <a:t>19/02/2023</a:t>
+              <a:t>20/02/2023</a:t>
             </a:fld>
             <a:endParaRPr lang="en-GB"/>
           </a:p>
@@ -3998,7 +4139,7 @@
           <a:p>
             <a:fld id="{CE3C2E0B-7B68-4022-B8D4-9A9E04BB8B1F}" type="datetimeFigureOut">
               <a:rPr lang="en-GB" smtClean="0"/>
-              <a:t>19/02/2023</a:t>
+              <a:t>20/02/2023</a:t>
             </a:fld>
             <a:endParaRPr lang="en-GB"/>
           </a:p>
@@ -4121,7 +4262,7 @@
           <a:p>
             <a:fld id="{CE3C2E0B-7B68-4022-B8D4-9A9E04BB8B1F}" type="datetimeFigureOut">
               <a:rPr lang="en-GB" smtClean="0"/>
-              <a:t>19/02/2023</a:t>
+              <a:t>20/02/2023</a:t>
             </a:fld>
             <a:endParaRPr lang="en-GB"/>
           </a:p>
@@ -4216,7 +4357,7 @@
           <a:p>
             <a:fld id="{CE3C2E0B-7B68-4022-B8D4-9A9E04BB8B1F}" type="datetimeFigureOut">
               <a:rPr lang="en-GB" smtClean="0"/>
-              <a:t>19/02/2023</a:t>
+              <a:t>20/02/2023</a:t>
             </a:fld>
             <a:endParaRPr lang="en-GB"/>
           </a:p>
@@ -4471,7 +4612,7 @@
           <a:p>
             <a:fld id="{CE3C2E0B-7B68-4022-B8D4-9A9E04BB8B1F}" type="datetimeFigureOut">
               <a:rPr lang="en-GB" smtClean="0"/>
-              <a:t>19/02/2023</a:t>
+              <a:t>20/02/2023</a:t>
             </a:fld>
             <a:endParaRPr lang="en-GB"/>
           </a:p>
@@ -4734,7 +4875,7 @@
           <a:p>
             <a:fld id="{CE3C2E0B-7B68-4022-B8D4-9A9E04BB8B1F}" type="datetimeFigureOut">
               <a:rPr lang="en-GB" smtClean="0"/>
-              <a:t>19/02/2023</a:t>
+              <a:t>20/02/2023</a:t>
             </a:fld>
             <a:endParaRPr lang="en-GB"/>
           </a:p>
@@ -5477,7 +5618,7 @@
           <a:p>
             <a:fld id="{CE3C2E0B-7B68-4022-B8D4-9A9E04BB8B1F}" type="datetimeFigureOut">
               <a:rPr lang="en-GB" smtClean="0"/>
-              <a:t>19/02/2023</a:t>
+              <a:t>20/02/2023</a:t>
             </a:fld>
             <a:endParaRPr lang="en-GB"/>
           </a:p>
@@ -6137,6 +6278,86 @@
               <a:t> is a free (open-source) automated testing framework used to validate web applications across different browsers and platforms. You can use multiple programming languages like Java, C#, Python, etc to create Selenium Test Scripts.</a:t>
             </a:r>
             <a:br>
+              <a:rPr lang="en-IN" sz="1800" b="0" i="0" dirty="0">
+                <a:solidFill>
+                  <a:srgbClr val="222222"/>
+                </a:solidFill>
+                <a:effectLst/>
+                <a:latin typeface="Source Sans Pro" panose="020B0503030403020204" pitchFamily="34" charset="0"/>
+              </a:rPr>
+            </a:br>
+            <a:r>
+              <a:rPr lang="en-IN" sz="1800" b="0" i="0" dirty="0">
+                <a:solidFill>
+                  <a:srgbClr val="222222"/>
+                </a:solidFill>
+                <a:effectLst/>
+                <a:latin typeface="Source Sans Pro" panose="020B0503030403020204" pitchFamily="34" charset="0"/>
+              </a:rPr>
+              <a:t>Open source</a:t>
+            </a:r>
+            <a:r>
+              <a:rPr lang="en-IN" sz="1800" b="0" i="0" dirty="0">
+                <a:solidFill>
+                  <a:srgbClr val="222222"/>
+                </a:solidFill>
+                <a:effectLst/>
+                <a:latin typeface="Source Sans Pro" panose="020B0503030403020204" pitchFamily="34" charset="0"/>
+                <a:sym typeface="Wingdings" panose="05000000000000000000" pitchFamily="2" charset="2"/>
+              </a:rPr>
+              <a:t></a:t>
+            </a:r>
+            <a:r>
+              <a:rPr lang="en-IN" sz="1800" b="0" i="0" dirty="0">
+                <a:solidFill>
+                  <a:srgbClr val="222222"/>
+                </a:solidFill>
+                <a:effectLst/>
+                <a:latin typeface="Source Sans Pro" panose="020B0503030403020204" pitchFamily="34" charset="0"/>
+              </a:rPr>
+              <a:t> meaning you don’t need any license or payment to use the tool</a:t>
+            </a:r>
+            <a:br>
+              <a:rPr lang="en-IN" sz="1800" b="0" i="0" dirty="0">
+                <a:solidFill>
+                  <a:srgbClr val="222222"/>
+                </a:solidFill>
+                <a:effectLst/>
+                <a:latin typeface="Source Sans Pro" panose="020B0503030403020204" pitchFamily="34" charset="0"/>
+              </a:rPr>
+            </a:br>
+            <a:r>
+              <a:rPr lang="en-IN" sz="1800" b="1" i="0" dirty="0">
+                <a:solidFill>
+                  <a:srgbClr val="222222"/>
+                </a:solidFill>
+                <a:effectLst/>
+                <a:latin typeface="Source Sans Pro" panose="020B0503030403020204" pitchFamily="34" charset="0"/>
+              </a:rPr>
+              <a:t>Limitation</a:t>
+            </a:r>
+            <a:r>
+              <a:rPr lang="en-IN" sz="1800" b="0" i="0" dirty="0">
+                <a:solidFill>
+                  <a:srgbClr val="222222"/>
+                </a:solidFill>
+                <a:effectLst/>
+                <a:latin typeface="Source Sans Pro" panose="020B0503030403020204" pitchFamily="34" charset="0"/>
+                <a:sym typeface="Wingdings" panose="05000000000000000000" pitchFamily="2" charset="2"/>
+              </a:rPr>
+              <a:t> </a:t>
+            </a:r>
+            <a:r>
+              <a:rPr lang="en-IN" sz="1800" b="0" i="0" dirty="0">
+                <a:solidFill>
+                  <a:srgbClr val="222222"/>
+                </a:solidFill>
+                <a:effectLst/>
+                <a:latin typeface="Source Sans Pro" panose="020B0503030403020204" pitchFamily="34" charset="0"/>
+              </a:rPr>
+              <a:t>You can only automate web applications using Selenium</a:t>
+            </a:r>
+            <a:br>
               <a:rPr lang="en-IN" sz="2000" b="0" i="0" dirty="0">
                 <a:solidFill>
                   <a:srgbClr val="222222"/>
@@ -6326,8 +6547,8 @@
         </p:blipFill>
         <p:spPr>
           <a:xfrm>
-            <a:off x="2902998" y="3941685"/>
-            <a:ext cx="6658252" cy="2371324"/>
+            <a:off x="2902998" y="4376690"/>
+            <a:ext cx="6658252" cy="2051727"/>
           </a:xfrm>
           <a:prstGeom prst="rect">
             <a:avLst/>
@@ -6394,24 +6615,102 @@
           <a:p>
             <a:pPr algn="l"/>
             <a:r>
-              <a:rPr lang="en-IN" sz="2000" b="1" dirty="0">
-                <a:solidFill>
-                  <a:srgbClr val="222222"/>
-                </a:solidFill>
-                <a:latin typeface="Source Sans Pro" panose="020B0503030403020204" pitchFamily="34" charset="0"/>
-              </a:rPr>
-              <a:t>What is Selenium IDE?</a:t>
+              <a:rPr lang="en-IN" sz="2000" b="1" i="0" dirty="0">
+                <a:solidFill>
+                  <a:srgbClr val="222222"/>
+                </a:solidFill>
+                <a:effectLst/>
+                <a:latin typeface="Source Sans Pro" panose="020B0503030403020204" pitchFamily="34" charset="0"/>
+              </a:rPr>
+              <a:t>Why do we automate web applications?</a:t>
             </a:r>
             <a:br>
-              <a:rPr lang="en-IN" sz="2000" b="1" dirty="0">
-                <a:solidFill>
-                  <a:srgbClr val="222222"/>
-                </a:solidFill>
+              <a:rPr lang="en-IN" sz="2000" b="1" i="0" dirty="0">
+                <a:solidFill>
+                  <a:srgbClr val="222222"/>
+                </a:solidFill>
+                <a:effectLst/>
+                <a:latin typeface="Source Sans Pro" panose="020B0503030403020204" pitchFamily="34" charset="0"/>
+              </a:rPr>
+            </a:br>
+            <a:r>
+              <a:rPr lang="en-IN" sz="2000" i="0" dirty="0">
+                <a:solidFill>
+                  <a:srgbClr val="222222"/>
+                </a:solidFill>
+                <a:effectLst/>
+                <a:latin typeface="Source Sans Pro" panose="020B0503030403020204" pitchFamily="34" charset="0"/>
+              </a:rPr>
+              <a:t>1. Reduce manual effort</a:t>
+            </a:r>
+            <a:br>
+              <a:rPr lang="en-IN" sz="2000" i="0" dirty="0">
+                <a:solidFill>
+                  <a:srgbClr val="222222"/>
+                </a:solidFill>
+                <a:effectLst/>
+                <a:latin typeface="Source Sans Pro" panose="020B0503030403020204" pitchFamily="34" charset="0"/>
+              </a:rPr>
+            </a:br>
+            <a:r>
+              <a:rPr lang="en-IN" sz="2000" i="0" dirty="0">
+                <a:solidFill>
+                  <a:srgbClr val="222222"/>
+                </a:solidFill>
+                <a:effectLst/>
+                <a:latin typeface="Source Sans Pro" panose="020B0503030403020204" pitchFamily="34" charset="0"/>
+              </a:rPr>
+              <a:t>2. Save time</a:t>
+            </a:r>
+            <a:br>
+              <a:rPr lang="en-IN" sz="2000" i="0" dirty="0">
+                <a:solidFill>
+                  <a:srgbClr val="222222"/>
+                </a:solidFill>
+                <a:effectLst/>
+                <a:latin typeface="Source Sans Pro" panose="020B0503030403020204" pitchFamily="34" charset="0"/>
+              </a:rPr>
+            </a:br>
+            <a:r>
+              <a:rPr lang="en-IN" sz="2000" i="0" dirty="0">
+                <a:solidFill>
+                  <a:srgbClr val="222222"/>
+                </a:solidFill>
+                <a:effectLst/>
+                <a:latin typeface="Source Sans Pro" panose="020B0503030403020204" pitchFamily="34" charset="0"/>
+              </a:rPr>
+              <a:t>3. Accurate results because human can make mistakes</a:t>
+            </a:r>
+            <a:br>
+              <a:rPr lang="en-IN" sz="2000" i="0" dirty="0">
+                <a:solidFill>
+                  <a:srgbClr val="222222"/>
+                </a:solidFill>
+                <a:effectLst/>
+                <a:latin typeface="Source Sans Pro" panose="020B0503030403020204" pitchFamily="34" charset="0"/>
+              </a:rPr>
+            </a:br>
+            <a:r>
+              <a:rPr lang="en-IN" sz="2000" i="0" dirty="0">
+                <a:solidFill>
+                  <a:srgbClr val="222222"/>
+                </a:solidFill>
+                <a:effectLst/>
+                <a:latin typeface="Source Sans Pro" panose="020B0503030403020204" pitchFamily="34" charset="0"/>
+              </a:rPr>
+              <a:t>4. Save cost/reduce cost</a:t>
+            </a:r>
+            <a:br>
+              <a:rPr lang="en-IN" sz="2000" i="0" dirty="0">
+                <a:solidFill>
+                  <a:srgbClr val="222222"/>
+                </a:solidFill>
+                <a:effectLst/>
                 <a:latin typeface="Source Sans Pro" panose="020B0503030403020204" pitchFamily="34" charset="0"/>
               </a:rPr>
             </a:br>
             <a:br>
-              <a:rPr lang="en-IN" sz="800" b="1" i="0" dirty="0">
+              <a:rPr lang="en-IN" sz="2000" i="0" dirty="0">
                 <a:solidFill>
                   <a:srgbClr val="222222"/>
                 </a:solidFill>
@@ -6420,16 +6719,51 @@
               </a:rPr>
             </a:br>
             <a:r>
-              <a:rPr lang="en-IN" sz="1800" dirty="0">
-                <a:solidFill>
-                  <a:srgbClr val="222222"/>
-                </a:solidFill>
-                <a:latin typeface="Source Sans Pro" panose="020B0503030403020204" pitchFamily="34" charset="0"/>
-              </a:rPr>
-              <a:t>Selenium Integrated Development Environment (IDE) is the simplest framework in the Selenium suite and is the easiest one to learn. </a:t>
+              <a:rPr lang="en-IN" sz="2000" b="1" i="0" dirty="0">
+                <a:solidFill>
+                  <a:srgbClr val="222222"/>
+                </a:solidFill>
+                <a:effectLst/>
+                <a:latin typeface="Source Sans Pro" panose="020B0503030403020204" pitchFamily="34" charset="0"/>
+              </a:rPr>
+              <a:t>What do we automate?</a:t>
             </a:r>
             <a:br>
-              <a:rPr lang="en-IN" sz="1800" dirty="0">
+              <a:rPr lang="en-GB" sz="2000" dirty="0">
+                <a:solidFill>
+                  <a:srgbClr val="222222"/>
+                </a:solidFill>
+                <a:latin typeface="Source Sans Pro" panose="020B0503030403020204" pitchFamily="34" charset="0"/>
+              </a:rPr>
+            </a:br>
+            <a:r>
+              <a:rPr lang="en-GB" sz="2000" dirty="0">
+                <a:solidFill>
+                  <a:srgbClr val="222222"/>
+                </a:solidFill>
+                <a:latin typeface="Source Sans Pro" panose="020B0503030403020204" pitchFamily="34" charset="0"/>
+              </a:rPr>
+              <a:t>1. Any operation performed on web application can be automated</a:t>
+            </a:r>
+            <a:br>
+              <a:rPr lang="en-GB" sz="2000" dirty="0">
+                <a:solidFill>
+                  <a:srgbClr val="222222"/>
+                </a:solidFill>
+                <a:latin typeface="Source Sans Pro" panose="020B0503030403020204" pitchFamily="34" charset="0"/>
+              </a:rPr>
+            </a:br>
+            <a:r>
+              <a:rPr lang="en-GB" sz="2000" dirty="0">
+                <a:solidFill>
+                  <a:srgbClr val="222222"/>
+                </a:solidFill>
+                <a:latin typeface="Source Sans Pro" panose="020B0503030403020204" pitchFamily="34" charset="0"/>
+              </a:rPr>
+              <a:t>2. In testing, we automate all the regression test cases and if possible then new feature test cases</a:t>
+            </a:r>
+            <a:br>
+              <a:rPr lang="en-GB" sz="2000" dirty="0">
                 <a:solidFill>
                   <a:srgbClr val="222222"/>
                 </a:solidFill>
@@ -6437,152 +6771,7 @@
               </a:rPr>
             </a:br>
             <a:br>
-              <a:rPr lang="en-IN" sz="1800" dirty="0">
-                <a:solidFill>
-                  <a:srgbClr val="222222"/>
-                </a:solidFill>
-                <a:latin typeface="Source Sans Pro" panose="020B0503030403020204" pitchFamily="34" charset="0"/>
-              </a:rPr>
-            </a:br>
-            <a:r>
-              <a:rPr lang="en-IN" sz="1800" dirty="0">
-                <a:solidFill>
-                  <a:srgbClr val="222222"/>
-                </a:solidFill>
-                <a:latin typeface="Source Sans Pro" panose="020B0503030403020204" pitchFamily="34" charset="0"/>
-              </a:rPr>
-              <a:t>It is a record and playback test automation for the web applications, it means that you can record an operation (like adding a product to cart in </a:t>
-            </a:r>
-            <a:r>
-              <a:rPr lang="en-IN" sz="1800" dirty="0" err="1">
-                <a:solidFill>
-                  <a:srgbClr val="222222"/>
-                </a:solidFill>
-                <a:latin typeface="Source Sans Pro" panose="020B0503030403020204" pitchFamily="34" charset="0"/>
-              </a:rPr>
-              <a:t>flipkart</a:t>
-            </a:r>
-            <a:r>
-              <a:rPr lang="en-IN" sz="1800" dirty="0">
-                <a:solidFill>
-                  <a:srgbClr val="222222"/>
-                </a:solidFill>
-                <a:latin typeface="Source Sans Pro" panose="020B0503030403020204" pitchFamily="34" charset="0"/>
-              </a:rPr>
-              <a:t>) and playback the recording anytime again,  so the Selenium IDE will do the same job (adding product to card) automatically for you without any manual intervention.</a:t>
-            </a:r>
-            <a:br>
-              <a:rPr lang="en-IN" sz="800" b="0" i="0" dirty="0">
-                <a:solidFill>
-                  <a:srgbClr val="222222"/>
-                </a:solidFill>
-                <a:effectLst/>
-                <a:latin typeface="Source Sans Pro" panose="020B0503030403020204" pitchFamily="34" charset="0"/>
-              </a:rPr>
-            </a:br>
-            <a:br>
-              <a:rPr lang="en-GB" sz="1800" dirty="0">
-                <a:solidFill>
-                  <a:srgbClr val="222222"/>
-                </a:solidFill>
-                <a:latin typeface="Source Sans Pro" panose="020B0503030403020204" pitchFamily="34" charset="0"/>
-              </a:rPr>
-            </a:br>
-            <a:r>
-              <a:rPr lang="en-GB" sz="2000" b="1" dirty="0">
-                <a:solidFill>
-                  <a:srgbClr val="222222"/>
-                </a:solidFill>
-                <a:latin typeface="Source Sans Pro" panose="020B0503030403020204" pitchFamily="34" charset="0"/>
-              </a:rPr>
-              <a:t>What is </a:t>
-            </a:r>
-            <a:r>
-              <a:rPr lang="en-IN" sz="2000" b="1" dirty="0">
-                <a:solidFill>
-                  <a:srgbClr val="222222"/>
-                </a:solidFill>
-                <a:latin typeface="Source Sans Pro" panose="020B0503030403020204" pitchFamily="34" charset="0"/>
-              </a:rPr>
-              <a:t>Selenium RC ?</a:t>
-            </a:r>
-            <a:br>
-              <a:rPr lang="en-IN" sz="2000" b="1" dirty="0">
-                <a:solidFill>
-                  <a:srgbClr val="222222"/>
-                </a:solidFill>
-                <a:latin typeface="Source Sans Pro" panose="020B0503030403020204" pitchFamily="34" charset="0"/>
-              </a:rPr>
-            </a:br>
-            <a:br>
-              <a:rPr lang="en-IN" sz="2000" b="1" dirty="0">
-                <a:solidFill>
-                  <a:srgbClr val="222222"/>
-                </a:solidFill>
-                <a:latin typeface="Source Sans Pro" panose="020B0503030403020204" pitchFamily="34" charset="0"/>
-              </a:rPr>
-            </a:br>
-            <a:r>
-              <a:rPr lang="en-IN" sz="1800" dirty="0">
-                <a:solidFill>
-                  <a:srgbClr val="222222"/>
-                </a:solidFill>
-                <a:latin typeface="Source Sans Pro" panose="020B0503030403020204" pitchFamily="34" charset="0"/>
-              </a:rPr>
-              <a:t>It is a testing framework that enables a QA or a developer to write test cases in any programming language in order to automate UI tests for web applications against any HTTP website</a:t>
-            </a:r>
-            <a:br>
-              <a:rPr lang="en-IN" sz="1800" dirty="0">
-                <a:solidFill>
-                  <a:srgbClr val="222222"/>
-                </a:solidFill>
-                <a:latin typeface="Source Sans Pro" panose="020B0503030403020204" pitchFamily="34" charset="0"/>
-              </a:rPr>
-            </a:br>
-            <a:br>
-              <a:rPr lang="en-IN" sz="1800" dirty="0">
-                <a:solidFill>
-                  <a:srgbClr val="222222"/>
-                </a:solidFill>
-                <a:latin typeface="Source Sans Pro" panose="020B0503030403020204" pitchFamily="34" charset="0"/>
-              </a:rPr>
-            </a:br>
-            <a:r>
-              <a:rPr lang="en-IN" sz="2000" b="1" dirty="0">
-                <a:solidFill>
-                  <a:srgbClr val="222222"/>
-                </a:solidFill>
-                <a:latin typeface="Source Sans Pro" panose="020B0503030403020204" pitchFamily="34" charset="0"/>
-              </a:rPr>
-              <a:t>What is Selenium Grid?</a:t>
-            </a:r>
-            <a:br>
-              <a:rPr lang="en-IN" sz="1800" dirty="0">
-                <a:solidFill>
-                  <a:srgbClr val="222222"/>
-                </a:solidFill>
-                <a:latin typeface="Source Sans Pro" panose="020B0503030403020204" pitchFamily="34" charset="0"/>
-              </a:rPr>
-            </a:br>
-            <a:br>
-              <a:rPr lang="en-IN" sz="1800" dirty="0">
-                <a:solidFill>
-                  <a:srgbClr val="222222"/>
-                </a:solidFill>
-                <a:latin typeface="Source Sans Pro" panose="020B0503030403020204" pitchFamily="34" charset="0"/>
-              </a:rPr>
-            </a:br>
-            <a:r>
-              <a:rPr lang="en-IN" sz="1800" dirty="0">
-                <a:solidFill>
-                  <a:srgbClr val="222222"/>
-                </a:solidFill>
-                <a:latin typeface="Source Sans Pro" panose="020B0503030403020204" pitchFamily="34" charset="0"/>
-              </a:rPr>
-              <a:t>Selenium Grid is a tool used together with Selenium RC to run tests on different machines against different browsers in parallel. That is, running multiple tests at the same time against different machines running different browsers and operating systems.</a:t>
-            </a:r>
-            <a:br>
-              <a:rPr lang="en-IN" sz="1800" dirty="0">
+              <a:rPr lang="en-GB" sz="2000" dirty="0">
                 <a:solidFill>
                   <a:srgbClr val="222222"/>
                 </a:solidFill>
@@ -6601,7 +6790,7 @@
     </p:spTree>
     <p:extLst>
       <p:ext uri="{BB962C8B-B14F-4D97-AF65-F5344CB8AC3E}">
-        <p14:creationId xmlns:p14="http://schemas.microsoft.com/office/powerpoint/2010/main" val="1022287705"/>
+        <p14:creationId xmlns:p14="http://schemas.microsoft.com/office/powerpoint/2010/main" val="3855450844"/>
       </p:ext>
     </p:extLst>
   </p:cSld>
@@ -6664,25 +6853,33 @@
                 </a:solidFill>
                 <a:latin typeface="Source Sans Pro" panose="020B0503030403020204" pitchFamily="34" charset="0"/>
               </a:rPr>
-              <a:t>What is Selenium </a:t>
-            </a:r>
-            <a:r>
-              <a:rPr lang="en-GB" sz="2000" b="1">
-                <a:solidFill>
-                  <a:srgbClr val="222222"/>
-                </a:solidFill>
-                <a:latin typeface="Source Sans Pro" panose="020B0503030403020204" pitchFamily="34" charset="0"/>
-              </a:rPr>
-              <a:t>Webdriver</a:t>
-            </a:r>
-            <a:r>
-              <a:rPr lang="en-GB" sz="2000" b="1" dirty="0">
-                <a:solidFill>
-                  <a:srgbClr val="222222"/>
-                </a:solidFill>
-                <a:latin typeface="Source Sans Pro" panose="020B0503030403020204" pitchFamily="34" charset="0"/>
-              </a:rPr>
-              <a:t>?</a:t>
+              <a:t>What is Selenium IDE?</a:t>
+            </a:r>
+            <a:br>
+              <a:rPr lang="en-IN" sz="2000" b="1" dirty="0">
+                <a:solidFill>
+                  <a:srgbClr val="222222"/>
+                </a:solidFill>
+                <a:latin typeface="Source Sans Pro" panose="020B0503030403020204" pitchFamily="34" charset="0"/>
+              </a:rPr>
+            </a:br>
+            <a:br>
+              <a:rPr lang="en-IN" sz="800" b="1" i="0" dirty="0">
+                <a:solidFill>
+                  <a:srgbClr val="222222"/>
+                </a:solidFill>
+                <a:effectLst/>
+                <a:latin typeface="Source Sans Pro" panose="020B0503030403020204" pitchFamily="34" charset="0"/>
+              </a:rPr>
+            </a:br>
+            <a:r>
+              <a:rPr lang="en-IN" sz="1800" dirty="0">
+                <a:solidFill>
+                  <a:srgbClr val="222222"/>
+                </a:solidFill>
+                <a:latin typeface="Source Sans Pro" panose="020B0503030403020204" pitchFamily="34" charset="0"/>
+              </a:rPr>
+              <a:t>Selenium Integrated Development Environment (IDE) is the simplest framework in the Selenium suite and is the easiest one to learn. </a:t>
             </a:r>
             <a:br>
               <a:rPr lang="en-IN" sz="1800" dirty="0">
@@ -6707,7 +6904,85 @@
                 </a:solidFill>
                 <a:latin typeface="Source Sans Pro" panose="020B0503030403020204" pitchFamily="34" charset="0"/>
               </a:rPr>
-              <a:t>WebDriver is a web framework that permits you to execute cross-browser tests. This tool is used for automating web-based application testing to verify that it performs expectedly. </a:t>
+              <a:t>It is a record and playback test automation for the web applications, it means that you can record an operation (like adding a product to cart in </a:t>
+            </a:r>
+            <a:r>
+              <a:rPr lang="en-IN" sz="1800" dirty="0" err="1">
+                <a:solidFill>
+                  <a:srgbClr val="222222"/>
+                </a:solidFill>
+                <a:latin typeface="Source Sans Pro" panose="020B0503030403020204" pitchFamily="34" charset="0"/>
+              </a:rPr>
+              <a:t>flipkart</a:t>
+            </a:r>
+            <a:r>
+              <a:rPr lang="en-IN" sz="1800" dirty="0">
+                <a:solidFill>
+                  <a:srgbClr val="222222"/>
+                </a:solidFill>
+                <a:latin typeface="Source Sans Pro" panose="020B0503030403020204" pitchFamily="34" charset="0"/>
+              </a:rPr>
+              <a:t>) and playback the recording anytime again,  so the Selenium IDE will do the same job (adding product to card) automatically for you without any manual intervention.</a:t>
+            </a:r>
+            <a:br>
+              <a:rPr lang="en-IN" sz="800" b="0" i="0" dirty="0">
+                <a:solidFill>
+                  <a:srgbClr val="222222"/>
+                </a:solidFill>
+                <a:effectLst/>
+                <a:latin typeface="Source Sans Pro" panose="020B0503030403020204" pitchFamily="34" charset="0"/>
+              </a:rPr>
+            </a:br>
+            <a:br>
+              <a:rPr lang="en-GB" sz="1800" dirty="0">
+                <a:solidFill>
+                  <a:srgbClr val="222222"/>
+                </a:solidFill>
+                <a:latin typeface="Source Sans Pro" panose="020B0503030403020204" pitchFamily="34" charset="0"/>
+              </a:rPr>
+            </a:br>
+            <a:r>
+              <a:rPr lang="en-GB" sz="2000" b="1" dirty="0">
+                <a:solidFill>
+                  <a:srgbClr val="222222"/>
+                </a:solidFill>
+                <a:latin typeface="Source Sans Pro" panose="020B0503030403020204" pitchFamily="34" charset="0"/>
+              </a:rPr>
+              <a:t>What is </a:t>
+            </a:r>
+            <a:r>
+              <a:rPr lang="en-IN" sz="2000" b="1" dirty="0">
+                <a:solidFill>
+                  <a:srgbClr val="222222"/>
+                </a:solidFill>
+                <a:latin typeface="Source Sans Pro" panose="020B0503030403020204" pitchFamily="34" charset="0"/>
+              </a:rPr>
+              <a:t>Selenium RC(remote control) ?</a:t>
+            </a:r>
+            <a:br>
+              <a:rPr lang="en-IN" sz="2000" b="1" dirty="0">
+                <a:solidFill>
+                  <a:srgbClr val="222222"/>
+                </a:solidFill>
+                <a:latin typeface="Source Sans Pro" panose="020B0503030403020204" pitchFamily="34" charset="0"/>
+              </a:rPr>
+            </a:br>
+            <a:br>
+              <a:rPr lang="en-IN" sz="2000" b="1" dirty="0">
+                <a:solidFill>
+                  <a:srgbClr val="222222"/>
+                </a:solidFill>
+                <a:latin typeface="Source Sans Pro" panose="020B0503030403020204" pitchFamily="34" charset="0"/>
+              </a:rPr>
+            </a:br>
+            <a:r>
+              <a:rPr lang="en-IN" sz="1800" dirty="0">
+                <a:solidFill>
+                  <a:srgbClr val="222222"/>
+                </a:solidFill>
+                <a:latin typeface="Source Sans Pro" panose="020B0503030403020204" pitchFamily="34" charset="0"/>
+              </a:rPr>
+              <a:t>It is a testing framework that enables a QA or a developer to write test cases in any programming language in order to automate UI tests for web applications against any HTTP website.</a:t>
             </a:r>
             <a:br>
               <a:rPr lang="en-IN" sz="1800" dirty="0">
@@ -6726,13 +7001,13 @@
               </a:rPr>
             </a:br>
             <a:r>
-              <a:rPr lang="en-IN" sz="1800" dirty="0">
-                <a:solidFill>
-                  <a:srgbClr val="222222"/>
-                </a:solidFill>
-                <a:latin typeface="Source Sans Pro" panose="020B0503030403020204" pitchFamily="34" charset="0"/>
-              </a:rPr>
-              <a:t>Selenium WebDriver allows you to choose a programming language to create test scripts.</a:t>
+              <a:rPr lang="en-IN" sz="2000" b="1" dirty="0">
+                <a:solidFill>
+                  <a:srgbClr val="222222"/>
+                </a:solidFill>
+                <a:latin typeface="Source Sans Pro" panose="020B0503030403020204" pitchFamily="34" charset="0"/>
+              </a:rPr>
+              <a:t>What is Selenium Grid?</a:t>
             </a:r>
             <a:br>
               <a:rPr lang="en-IN" sz="1800" dirty="0">
@@ -6757,7 +7032,7 @@
                 </a:solidFill>
                 <a:latin typeface="Source Sans Pro" panose="020B0503030403020204" pitchFamily="34" charset="0"/>
               </a:rPr>
-              <a:t>Web driver is the mostly used frameworks in IT and it can automate any type of Web applications.</a:t>
+              <a:t>Selenium Grid is a tool used together with Selenium RC to run tests on different machines against different browsers in parallel. That is, running multiple tests at the same time against different machines running different browsers and operating systems.</a:t>
             </a:r>
             <a:br>
               <a:rPr lang="en-IN" sz="1800" dirty="0">
@@ -6767,7 +7042,7 @@
                 <a:latin typeface="Source Sans Pro" panose="020B0503030403020204" pitchFamily="34" charset="0"/>
               </a:rPr>
             </a:br>
-            <a:endParaRPr lang="en-GB" sz="1800" dirty="0">
+            <a:endParaRPr lang="en-GB" sz="2000" dirty="0">
               <a:solidFill>
                 <a:srgbClr val="222222"/>
               </a:solidFill>
@@ -6776,46 +7051,10 @@
           </a:p>
         </p:txBody>
       </p:sp>
-      <p:pic>
-        <p:nvPicPr>
-          <p:cNvPr id="4" name="Picture 3">
-            <a:extLst>
-              <a:ext uri="{FF2B5EF4-FFF2-40B4-BE49-F238E27FC236}">
-                <a16:creationId xmlns:a16="http://schemas.microsoft.com/office/drawing/2014/main" id="{CE20A5B8-6A94-8174-A56D-DD8D973338DE}"/>
-              </a:ext>
-            </a:extLst>
-          </p:cNvPr>
-          <p:cNvPicPr>
-            <a:picLocks noChangeAspect="1"/>
-          </p:cNvPicPr>
-          <p:nvPr/>
-        </p:nvPicPr>
-        <p:blipFill>
-          <a:blip r:embed="rId2">
-            <a:extLst>
-              <a:ext uri="{28A0092B-C50C-407E-A947-70E740481C1C}">
-                <a14:useLocalDpi xmlns:a14="http://schemas.microsoft.com/office/drawing/2010/main" val="0"/>
-              </a:ext>
-            </a:extLst>
-          </a:blip>
-          <a:stretch>
-            <a:fillRect/>
-          </a:stretch>
-        </p:blipFill>
-        <p:spPr>
-          <a:xfrm>
-            <a:off x="1020932" y="2734323"/>
-            <a:ext cx="8131946" cy="3889082"/>
-          </a:xfrm>
-          <a:prstGeom prst="rect">
-            <a:avLst/>
-          </a:prstGeom>
-        </p:spPr>
-      </p:pic>
     </p:spTree>
     <p:extLst>
       <p:ext uri="{BB962C8B-B14F-4D97-AF65-F5344CB8AC3E}">
-        <p14:creationId xmlns:p14="http://schemas.microsoft.com/office/powerpoint/2010/main" val="3803384798"/>
+        <p14:creationId xmlns:p14="http://schemas.microsoft.com/office/powerpoint/2010/main" val="1022287705"/>
       </p:ext>
     </p:extLst>
   </p:cSld>
@@ -6878,6 +7117,237 @@
                 </a:solidFill>
                 <a:latin typeface="Source Sans Pro" panose="020B0503030403020204" pitchFamily="34" charset="0"/>
               </a:rPr>
+              <a:t>What is Selenium </a:t>
+            </a:r>
+            <a:r>
+              <a:rPr lang="en-GB" sz="2000" b="1" dirty="0" err="1">
+                <a:solidFill>
+                  <a:srgbClr val="222222"/>
+                </a:solidFill>
+                <a:latin typeface="Source Sans Pro" panose="020B0503030403020204" pitchFamily="34" charset="0"/>
+              </a:rPr>
+              <a:t>Webdriver</a:t>
+            </a:r>
+            <a:r>
+              <a:rPr lang="en-GB" sz="2000" b="1" dirty="0">
+                <a:solidFill>
+                  <a:srgbClr val="222222"/>
+                </a:solidFill>
+                <a:latin typeface="Source Sans Pro" panose="020B0503030403020204" pitchFamily="34" charset="0"/>
+              </a:rPr>
+              <a:t>?</a:t>
+            </a:r>
+            <a:br>
+              <a:rPr lang="en-IN" sz="1800" dirty="0">
+                <a:solidFill>
+                  <a:srgbClr val="222222"/>
+                </a:solidFill>
+                <a:latin typeface="Source Sans Pro" panose="020B0503030403020204" pitchFamily="34" charset="0"/>
+              </a:rPr>
+            </a:br>
+            <a:br>
+              <a:rPr lang="en-IN" sz="1800" dirty="0">
+                <a:solidFill>
+                  <a:srgbClr val="222222"/>
+                </a:solidFill>
+                <a:latin typeface="Source Sans Pro" panose="020B0503030403020204" pitchFamily="34" charset="0"/>
+              </a:rPr>
+            </a:br>
+            <a:r>
+              <a:rPr lang="en-IN" sz="1800" dirty="0">
+                <a:solidFill>
+                  <a:srgbClr val="222222"/>
+                </a:solidFill>
+                <a:latin typeface="Source Sans Pro" panose="020B0503030403020204" pitchFamily="34" charset="0"/>
+              </a:rPr>
+              <a:t>WebDriver is a web framework that permits you to execute cross-browser tests. This tool is used for automating web-based application testing to verify that it performs expectedly. </a:t>
+            </a:r>
+            <a:br>
+              <a:rPr lang="en-IN" sz="1800" dirty="0">
+                <a:solidFill>
+                  <a:srgbClr val="222222"/>
+                </a:solidFill>
+                <a:latin typeface="Source Sans Pro" panose="020B0503030403020204" pitchFamily="34" charset="0"/>
+              </a:rPr>
+            </a:br>
+            <a:br>
+              <a:rPr lang="en-IN" sz="1800" dirty="0">
+                <a:solidFill>
+                  <a:srgbClr val="222222"/>
+                </a:solidFill>
+                <a:latin typeface="Source Sans Pro" panose="020B0503030403020204" pitchFamily="34" charset="0"/>
+              </a:rPr>
+            </a:br>
+            <a:r>
+              <a:rPr lang="en-IN" sz="1800" dirty="0">
+                <a:solidFill>
+                  <a:srgbClr val="222222"/>
+                </a:solidFill>
+                <a:latin typeface="Source Sans Pro" panose="020B0503030403020204" pitchFamily="34" charset="0"/>
+              </a:rPr>
+              <a:t>Selenium WebDriver allows you to choose a programming language to create test scripts.</a:t>
+            </a:r>
+            <a:br>
+              <a:rPr lang="en-IN" sz="1800" dirty="0">
+                <a:solidFill>
+                  <a:srgbClr val="222222"/>
+                </a:solidFill>
+                <a:latin typeface="Source Sans Pro" panose="020B0503030403020204" pitchFamily="34" charset="0"/>
+              </a:rPr>
+            </a:br>
+            <a:br>
+              <a:rPr lang="en-IN" sz="1800" dirty="0">
+                <a:solidFill>
+                  <a:srgbClr val="222222"/>
+                </a:solidFill>
+                <a:latin typeface="Source Sans Pro" panose="020B0503030403020204" pitchFamily="34" charset="0"/>
+              </a:rPr>
+            </a:br>
+            <a:r>
+              <a:rPr lang="en-IN" sz="1800" dirty="0">
+                <a:solidFill>
+                  <a:srgbClr val="222222"/>
+                </a:solidFill>
+                <a:latin typeface="Source Sans Pro" panose="020B0503030403020204" pitchFamily="34" charset="0"/>
+              </a:rPr>
+              <a:t>Web driver is the mostly used frameworks in IT and it can automate any type of Web applications.</a:t>
+            </a:r>
+            <a:br>
+              <a:rPr lang="en-IN" sz="1800" dirty="0">
+                <a:solidFill>
+                  <a:srgbClr val="222222"/>
+                </a:solidFill>
+                <a:latin typeface="Source Sans Pro" panose="020B0503030403020204" pitchFamily="34" charset="0"/>
+              </a:rPr>
+            </a:br>
+            <a:r>
+              <a:rPr lang="en-IN" sz="1800" dirty="0">
+                <a:solidFill>
+                  <a:srgbClr val="222222"/>
+                </a:solidFill>
+                <a:latin typeface="Source Sans Pro" panose="020B0503030403020204" pitchFamily="34" charset="0"/>
+              </a:rPr>
+              <a:t>JSON- java script object notation</a:t>
+            </a:r>
+            <a:br>
+              <a:rPr lang="en-IN" sz="1800" dirty="0">
+                <a:solidFill>
+                  <a:srgbClr val="222222"/>
+                </a:solidFill>
+                <a:latin typeface="Source Sans Pro" panose="020B0503030403020204" pitchFamily="34" charset="0"/>
+              </a:rPr>
+            </a:br>
+            <a:endParaRPr lang="en-GB" sz="1800" dirty="0">
+              <a:solidFill>
+                <a:srgbClr val="222222"/>
+              </a:solidFill>
+              <a:latin typeface="Source Sans Pro" panose="020B0503030403020204" pitchFamily="34" charset="0"/>
+            </a:endParaRPr>
+          </a:p>
+        </p:txBody>
+      </p:sp>
+      <p:pic>
+        <p:nvPicPr>
+          <p:cNvPr id="4" name="Picture 3">
+            <a:extLst>
+              <a:ext uri="{FF2B5EF4-FFF2-40B4-BE49-F238E27FC236}">
+                <a16:creationId xmlns:a16="http://schemas.microsoft.com/office/drawing/2014/main" id="{CE20A5B8-6A94-8174-A56D-DD8D973338DE}"/>
+              </a:ext>
+            </a:extLst>
+          </p:cNvPr>
+          <p:cNvPicPr>
+            <a:picLocks noChangeAspect="1"/>
+          </p:cNvPicPr>
+          <p:nvPr/>
+        </p:nvPicPr>
+        <p:blipFill>
+          <a:blip r:embed="rId2">
+            <a:extLst>
+              <a:ext uri="{28A0092B-C50C-407E-A947-70E740481C1C}">
+                <a14:useLocalDpi xmlns:a14="http://schemas.microsoft.com/office/drawing/2010/main" val="0"/>
+              </a:ext>
+            </a:extLst>
+          </a:blip>
+          <a:stretch>
+            <a:fillRect/>
+          </a:stretch>
+        </p:blipFill>
+        <p:spPr>
+          <a:xfrm>
+            <a:off x="1020932" y="2911875"/>
+            <a:ext cx="8131946" cy="3711529"/>
+          </a:xfrm>
+          <a:prstGeom prst="rect">
+            <a:avLst/>
+          </a:prstGeom>
+        </p:spPr>
+      </p:pic>
+    </p:spTree>
+    <p:extLst>
+      <p:ext uri="{BB962C8B-B14F-4D97-AF65-F5344CB8AC3E}">
+        <p14:creationId xmlns:p14="http://schemas.microsoft.com/office/powerpoint/2010/main" val="3803384798"/>
+      </p:ext>
+    </p:extLst>
+  </p:cSld>
+  <p:clrMapOvr>
+    <a:masterClrMapping/>
+  </p:clrMapOvr>
+</p:sld>
+</file>
+
+<file path=ppt/slides/slide6.xml><?xml version="1.0" encoding="utf-8"?>
+<p:sld xmlns:a="http://schemas.openxmlformats.org/drawingml/2006/main" xmlns:r="http://schemas.openxmlformats.org/officeDocument/2006/relationships" xmlns:p="http://schemas.openxmlformats.org/presentationml/2006/main">
+  <p:cSld>
+    <p:spTree>
+      <p:nvGrpSpPr>
+        <p:cNvPr id="1" name=""/>
+        <p:cNvGrpSpPr/>
+        <p:nvPr/>
+      </p:nvGrpSpPr>
+      <p:grpSpPr>
+        <a:xfrm>
+          <a:off x="0" y="0"/>
+          <a:ext cx="0" cy="0"/>
+          <a:chOff x="0" y="0"/>
+          <a:chExt cx="0" cy="0"/>
+        </a:xfrm>
+      </p:grpSpPr>
+      <p:sp>
+        <p:nvSpPr>
+          <p:cNvPr id="2" name="Title 1">
+            <a:extLst>
+              <a:ext uri="{FF2B5EF4-FFF2-40B4-BE49-F238E27FC236}">
+                <a16:creationId xmlns:a16="http://schemas.microsoft.com/office/drawing/2014/main" id="{5F302912-3444-BFCB-4DD7-7240B4271F2E}"/>
+              </a:ext>
+            </a:extLst>
+          </p:cNvPr>
+          <p:cNvSpPr>
+            <a:spLocks noGrp="1"/>
+          </p:cNvSpPr>
+          <p:nvPr>
+            <p:ph type="ctrTitle"/>
+          </p:nvPr>
+        </p:nvSpPr>
+        <p:spPr>
+          <a:xfrm>
+            <a:off x="665825" y="234595"/>
+            <a:ext cx="10884024" cy="6361513"/>
+          </a:xfrm>
+        </p:spPr>
+        <p:txBody>
+          <a:bodyPr anchor="t">
+            <a:normAutofit/>
+          </a:bodyPr>
+          <a:lstStyle/>
+          <a:p>
+            <a:pPr algn="l"/>
+            <a:r>
+              <a:rPr lang="en-IN" sz="2000" b="1" dirty="0">
+                <a:solidFill>
+                  <a:srgbClr val="222222"/>
+                </a:solidFill>
+                <a:latin typeface="Source Sans Pro" panose="020B0503030403020204" pitchFamily="34" charset="0"/>
+              </a:rPr>
               <a:t>What is </a:t>
             </a:r>
             <a:r>
@@ -6937,7 +7407,7 @@
                 </a:solidFill>
                 <a:latin typeface="Source Sans Pro" panose="020B0503030403020204" pitchFamily="34" charset="0"/>
               </a:rPr>
-              <a:t>So when you want to perform some action on website, you need to click on the button or enter something in the textbox, so how do we do this using automation tools like Selenium?</a:t>
+              <a:t>So when you want to perform some action on website, for example you need to click on the button or enter something in the textbox, so how do we do this using automation tools like Selenium?</a:t>
             </a:r>
             <a:br>
               <a:rPr lang="en-IN" sz="1800" dirty="0">
@@ -7070,14 +7540,14 @@
           <p:nvPr>
             <p:extLst>
               <p:ext uri="{D42A27DB-BD31-4B8C-83A1-F6EECF244321}">
-                <p14:modId xmlns:p14="http://schemas.microsoft.com/office/powerpoint/2010/main" val="1313010573"/>
+                <p14:modId xmlns:p14="http://schemas.microsoft.com/office/powerpoint/2010/main" val="494463120"/>
               </p:ext>
             </p:extLst>
           </p:nvPr>
         </p:nvGraphicFramePr>
         <p:xfrm>
-          <a:off x="805548" y="4174990"/>
-          <a:ext cx="9297240" cy="2216934"/>
+          <a:off x="805548" y="4163627"/>
+          <a:ext cx="9297240" cy="2228297"/>
         </p:xfrm>
         <a:graphic>
           <a:graphicData uri="http://schemas.openxmlformats.org/drawingml/2006/table">
@@ -7106,7 +7576,7 @@
                   </a:extLst>
                 </a:gridCol>
               </a:tblGrid>
-              <a:tr h="246326">
+              <a:tr h="257689">
                 <a:tc>
                   <a:txBody>
                     <a:bodyPr/>
@@ -7301,7 +7771,7 @@
                     <a:p>
                       <a:pPr algn="l" fontAlgn="ctr"/>
                       <a:r>
-                        <a:rPr lang="en-GB" sz="900" b="0" i="0" u="none" strike="noStrike">
+                        <a:rPr lang="en-GB" sz="900" b="0" i="0" u="none" strike="noStrike" dirty="0">
                           <a:solidFill>
                             <a:srgbClr val="212529"/>
                           </a:solidFill>
@@ -7358,14 +7828,24 @@
                     <a:p>
                       <a:pPr algn="l" fontAlgn="t"/>
                       <a:r>
-                        <a:rPr lang="en-GB" sz="900" b="0" i="0" u="none" strike="noStrike">
+                        <a:rPr lang="en-GB" sz="900" b="0" i="0" u="none" strike="noStrike" dirty="0" err="1">
                           <a:solidFill>
                             <a:srgbClr val="212529"/>
                           </a:solidFill>
                           <a:effectLst/>
                           <a:latin typeface="Nunito" pitchFamily="2" charset="0"/>
                         </a:rPr>
-                        <a:t>driver.findElement(By.id (&lt;element ID&gt;))</a:t>
+                        <a:t>driver.findElement</a:t>
+                      </a:r>
+                      <a:r>
+                        <a:rPr lang="en-GB" sz="900" b="0" i="0" u="none" strike="noStrike" dirty="0">
+                          <a:solidFill>
+                            <a:srgbClr val="212529"/>
+                          </a:solidFill>
+                          <a:effectLst/>
+                          <a:latin typeface="Nunito" pitchFamily="2" charset="0"/>
+                        </a:rPr>
+                        <a:t>(By.id (&lt;element ID&gt;))</a:t>
                       </a:r>
                     </a:p>
                   </a:txBody>
@@ -8725,6 +9205,2072 @@
     <p:extLst>
       <p:ext uri="{BB962C8B-B14F-4D97-AF65-F5344CB8AC3E}">
         <p14:creationId xmlns:p14="http://schemas.microsoft.com/office/powerpoint/2010/main" val="4101074739"/>
+      </p:ext>
+    </p:extLst>
+  </p:cSld>
+  <p:clrMapOvr>
+    <a:masterClrMapping/>
+  </p:clrMapOvr>
+</p:sld>
+</file>
+
+<file path=ppt/slides/slide7.xml><?xml version="1.0" encoding="utf-8"?>
+<p:sld xmlns:a="http://schemas.openxmlformats.org/drawingml/2006/main" xmlns:r="http://schemas.openxmlformats.org/officeDocument/2006/relationships" xmlns:p="http://schemas.openxmlformats.org/presentationml/2006/main">
+  <p:cSld>
+    <p:spTree>
+      <p:nvGrpSpPr>
+        <p:cNvPr id="1" name=""/>
+        <p:cNvGrpSpPr/>
+        <p:nvPr/>
+      </p:nvGrpSpPr>
+      <p:grpSpPr>
+        <a:xfrm>
+          <a:off x="0" y="0"/>
+          <a:ext cx="0" cy="0"/>
+          <a:chOff x="0" y="0"/>
+          <a:chExt cx="0" cy="0"/>
+        </a:xfrm>
+      </p:grpSpPr>
+      <p:sp>
+        <p:nvSpPr>
+          <p:cNvPr id="2" name="Title 1">
+            <a:extLst>
+              <a:ext uri="{FF2B5EF4-FFF2-40B4-BE49-F238E27FC236}">
+                <a16:creationId xmlns:a16="http://schemas.microsoft.com/office/drawing/2014/main" id="{5F302912-3444-BFCB-4DD7-7240B4271F2E}"/>
+              </a:ext>
+            </a:extLst>
+          </p:cNvPr>
+          <p:cNvSpPr>
+            <a:spLocks noGrp="1"/>
+          </p:cNvSpPr>
+          <p:nvPr>
+            <p:ph type="ctrTitle"/>
+          </p:nvPr>
+        </p:nvSpPr>
+        <p:spPr>
+          <a:xfrm>
+            <a:off x="665825" y="234595"/>
+            <a:ext cx="10884024" cy="6361513"/>
+          </a:xfrm>
+        </p:spPr>
+        <p:txBody>
+          <a:bodyPr anchor="t">
+            <a:normAutofit/>
+          </a:bodyPr>
+          <a:lstStyle/>
+          <a:p>
+            <a:pPr algn="l"/>
+            <a:r>
+              <a:rPr lang="en-GB" sz="2000" b="1" dirty="0">
+                <a:solidFill>
+                  <a:srgbClr val="222222"/>
+                </a:solidFill>
+                <a:latin typeface="Source Sans Pro" panose="020B0503030403020204" pitchFamily="34" charset="0"/>
+              </a:rPr>
+              <a:t>Locators example:</a:t>
+            </a:r>
+            <a:br>
+              <a:rPr lang="en-GB" sz="2000" b="1" dirty="0">
+                <a:solidFill>
+                  <a:srgbClr val="222222"/>
+                </a:solidFill>
+                <a:latin typeface="Source Sans Pro" panose="020B0503030403020204" pitchFamily="34" charset="0"/>
+              </a:rPr>
+            </a:br>
+            <a:br>
+              <a:rPr lang="en-GB" sz="2000" b="1" dirty="0">
+                <a:solidFill>
+                  <a:srgbClr val="222222"/>
+                </a:solidFill>
+                <a:latin typeface="Source Sans Pro" panose="020B0503030403020204" pitchFamily="34" charset="0"/>
+              </a:rPr>
+            </a:br>
+            <a:r>
+              <a:rPr lang="en-GB" sz="2000" dirty="0">
+                <a:solidFill>
+                  <a:srgbClr val="222222"/>
+                </a:solidFill>
+                <a:latin typeface="Source Sans Pro" panose="020B0503030403020204" pitchFamily="34" charset="0"/>
+              </a:rPr>
+              <a:t>Website-</a:t>
+            </a:r>
+            <a:r>
+              <a:rPr lang="en-GB" sz="2000" b="1" dirty="0">
+                <a:solidFill>
+                  <a:srgbClr val="222222"/>
+                </a:solidFill>
+                <a:latin typeface="Source Sans Pro" panose="020B0503030403020204" pitchFamily="34" charset="0"/>
+              </a:rPr>
+              <a:t> </a:t>
+            </a:r>
+            <a:r>
+              <a:rPr lang="en-GB" sz="2000" dirty="0">
+                <a:solidFill>
+                  <a:srgbClr val="222222"/>
+                </a:solidFill>
+                <a:latin typeface="Source Sans Pro" panose="020B0503030403020204" pitchFamily="34" charset="0"/>
+                <a:hlinkClick r:id="rId2"/>
+              </a:rPr>
+              <a:t>https://www.taskarmall.com/Adminlogin</a:t>
+            </a:r>
+            <a:br>
+              <a:rPr lang="en-GB" sz="2000" dirty="0">
+                <a:solidFill>
+                  <a:srgbClr val="222222"/>
+                </a:solidFill>
+                <a:latin typeface="Source Sans Pro" panose="020B0503030403020204" pitchFamily="34" charset="0"/>
+              </a:rPr>
+            </a:br>
+            <a:br>
+              <a:rPr lang="en-GB" sz="2000" dirty="0">
+                <a:solidFill>
+                  <a:srgbClr val="222222"/>
+                </a:solidFill>
+                <a:latin typeface="Source Sans Pro" panose="020B0503030403020204" pitchFamily="34" charset="0"/>
+              </a:rPr>
+            </a:br>
+            <a:r>
+              <a:rPr lang="en-GB" sz="2000" dirty="0">
+                <a:solidFill>
+                  <a:srgbClr val="222222"/>
+                </a:solidFill>
+                <a:latin typeface="Source Sans Pro" panose="020B0503030403020204" pitchFamily="34" charset="0"/>
+              </a:rPr>
+              <a:t>1. Identify action/operation</a:t>
+            </a:r>
+            <a:r>
+              <a:rPr lang="en-GB" sz="2000" dirty="0">
+                <a:solidFill>
+                  <a:srgbClr val="222222"/>
+                </a:solidFill>
+                <a:latin typeface="Source Sans Pro" panose="020B0503030403020204" pitchFamily="34" charset="0"/>
+                <a:sym typeface="Wingdings" panose="05000000000000000000" pitchFamily="2" charset="2"/>
+              </a:rPr>
+              <a:t> for example Enter user name</a:t>
+            </a:r>
+            <a:br>
+              <a:rPr lang="en-GB" sz="2000" dirty="0">
+                <a:solidFill>
+                  <a:srgbClr val="222222"/>
+                </a:solidFill>
+                <a:latin typeface="Source Sans Pro" panose="020B0503030403020204" pitchFamily="34" charset="0"/>
+                <a:sym typeface="Wingdings" panose="05000000000000000000" pitchFamily="2" charset="2"/>
+              </a:rPr>
+            </a:br>
+            <a:r>
+              <a:rPr lang="en-GB" sz="2000" dirty="0">
+                <a:solidFill>
+                  <a:srgbClr val="222222"/>
+                </a:solidFill>
+                <a:latin typeface="Source Sans Pro" panose="020B0503030403020204" pitchFamily="34" charset="0"/>
+                <a:sym typeface="Wingdings" panose="05000000000000000000" pitchFamily="2" charset="2"/>
+              </a:rPr>
+              <a:t>2. Right click on the web element( textbox or button or link)</a:t>
+            </a:r>
+            <a:br>
+              <a:rPr lang="en-GB" sz="2000" dirty="0">
+                <a:solidFill>
+                  <a:srgbClr val="222222"/>
+                </a:solidFill>
+                <a:latin typeface="Source Sans Pro" panose="020B0503030403020204" pitchFamily="34" charset="0"/>
+                <a:sym typeface="Wingdings" panose="05000000000000000000" pitchFamily="2" charset="2"/>
+              </a:rPr>
+            </a:br>
+            <a:r>
+              <a:rPr lang="en-GB" sz="2000" dirty="0">
+                <a:solidFill>
+                  <a:srgbClr val="222222"/>
+                </a:solidFill>
+                <a:latin typeface="Source Sans Pro" panose="020B0503030403020204" pitchFamily="34" charset="0"/>
+                <a:sym typeface="Wingdings" panose="05000000000000000000" pitchFamily="2" charset="2"/>
+              </a:rPr>
+              <a:t>3. Click on inspect</a:t>
+            </a:r>
+            <a:br>
+              <a:rPr lang="en-GB" sz="2000" dirty="0">
+                <a:solidFill>
+                  <a:srgbClr val="222222"/>
+                </a:solidFill>
+                <a:latin typeface="Source Sans Pro" panose="020B0503030403020204" pitchFamily="34" charset="0"/>
+                <a:sym typeface="Wingdings" panose="05000000000000000000" pitchFamily="2" charset="2"/>
+              </a:rPr>
+            </a:br>
+            <a:r>
+              <a:rPr lang="en-GB" sz="2000" dirty="0">
+                <a:solidFill>
+                  <a:srgbClr val="222222"/>
+                </a:solidFill>
+                <a:latin typeface="Source Sans Pro" panose="020B0503030403020204" pitchFamily="34" charset="0"/>
+                <a:sym typeface="Wingdings" panose="05000000000000000000" pitchFamily="2" charset="2"/>
+              </a:rPr>
+              <a:t>4. Note down the locator you want to use for example id=“</a:t>
+            </a:r>
+            <a:r>
+              <a:rPr lang="en-GB" sz="2000" dirty="0" err="1">
+                <a:solidFill>
+                  <a:srgbClr val="222222"/>
+                </a:solidFill>
+                <a:latin typeface="Source Sans Pro" panose="020B0503030403020204" pitchFamily="34" charset="0"/>
+                <a:sym typeface="Wingdings" panose="05000000000000000000" pitchFamily="2" charset="2"/>
+              </a:rPr>
+              <a:t>LoginID</a:t>
+            </a:r>
+            <a:r>
+              <a:rPr lang="en-GB" sz="2000" dirty="0">
+                <a:solidFill>
+                  <a:srgbClr val="222222"/>
+                </a:solidFill>
+                <a:latin typeface="Source Sans Pro" panose="020B0503030403020204" pitchFamily="34" charset="0"/>
+                <a:sym typeface="Wingdings" panose="05000000000000000000" pitchFamily="2" charset="2"/>
+              </a:rPr>
+              <a:t>”</a:t>
+            </a:r>
+            <a:br>
+              <a:rPr lang="en-GB" sz="2000" dirty="0">
+                <a:solidFill>
+                  <a:srgbClr val="222222"/>
+                </a:solidFill>
+                <a:latin typeface="Source Sans Pro" panose="020B0503030403020204" pitchFamily="34" charset="0"/>
+                <a:sym typeface="Wingdings" panose="05000000000000000000" pitchFamily="2" charset="2"/>
+              </a:rPr>
+            </a:br>
+            <a:br>
+              <a:rPr lang="en-GB" sz="2000" dirty="0">
+                <a:solidFill>
+                  <a:srgbClr val="222222"/>
+                </a:solidFill>
+                <a:latin typeface="Source Sans Pro" panose="020B0503030403020204" pitchFamily="34" charset="0"/>
+                <a:sym typeface="Wingdings" panose="05000000000000000000" pitchFamily="2" charset="2"/>
+              </a:rPr>
+            </a:br>
+            <a:r>
+              <a:rPr lang="en-GB" sz="2000" dirty="0">
+                <a:solidFill>
+                  <a:srgbClr val="222222"/>
+                </a:solidFill>
+                <a:latin typeface="Source Sans Pro" panose="020B0503030403020204" pitchFamily="34" charset="0"/>
+                <a:sym typeface="Wingdings" panose="05000000000000000000" pitchFamily="2" charset="2"/>
+              </a:rPr>
+              <a:t>ID locator= </a:t>
+            </a:r>
+            <a:r>
+              <a:rPr lang="en-GB" sz="1800" b="0" i="0" u="none" strike="noStrike" dirty="0" err="1">
+                <a:solidFill>
+                  <a:srgbClr val="212529"/>
+                </a:solidFill>
+                <a:effectLst/>
+                <a:latin typeface="Nunito" pitchFamily="2" charset="0"/>
+              </a:rPr>
+              <a:t>driver.findElement</a:t>
+            </a:r>
+            <a:r>
+              <a:rPr lang="en-GB" sz="1800" b="0" i="0" u="none" strike="noStrike" dirty="0">
+                <a:solidFill>
+                  <a:srgbClr val="212529"/>
+                </a:solidFill>
+                <a:effectLst/>
+                <a:latin typeface="Nunito" pitchFamily="2" charset="0"/>
+              </a:rPr>
+              <a:t>(By.id (</a:t>
+            </a:r>
+            <a:r>
+              <a:rPr lang="en-GB" sz="1800" dirty="0" err="1">
+                <a:solidFill>
+                  <a:srgbClr val="222222"/>
+                </a:solidFill>
+                <a:latin typeface="Source Sans Pro" panose="020B0503030403020204" pitchFamily="34" charset="0"/>
+                <a:sym typeface="Wingdings" panose="05000000000000000000" pitchFamily="2" charset="2"/>
+              </a:rPr>
+              <a:t>LoginID</a:t>
+            </a:r>
+            <a:r>
+              <a:rPr lang="en-GB" sz="1800" b="0" i="0" u="none" strike="noStrike" dirty="0">
+                <a:solidFill>
+                  <a:srgbClr val="212529"/>
+                </a:solidFill>
+                <a:effectLst/>
+                <a:latin typeface="Nunito" pitchFamily="2" charset="0"/>
+              </a:rPr>
+              <a:t>))</a:t>
+            </a:r>
+            <a:br>
+              <a:rPr lang="en-GB" sz="1800" b="0" i="0" u="none" strike="noStrike" dirty="0">
+                <a:solidFill>
+                  <a:srgbClr val="212529"/>
+                </a:solidFill>
+                <a:effectLst/>
+                <a:latin typeface="Nunito" pitchFamily="2" charset="0"/>
+              </a:rPr>
+            </a:br>
+            <a:br>
+              <a:rPr lang="en-GB" sz="1800" b="0" i="0" u="none" strike="noStrike" dirty="0">
+                <a:solidFill>
+                  <a:srgbClr val="212529"/>
+                </a:solidFill>
+                <a:effectLst/>
+                <a:latin typeface="Nunito" pitchFamily="2" charset="0"/>
+              </a:rPr>
+            </a:br>
+            <a:r>
+              <a:rPr lang="en-GB" sz="1800" b="0" i="0" u="none" strike="noStrike" dirty="0">
+                <a:solidFill>
+                  <a:srgbClr val="212529"/>
+                </a:solidFill>
+                <a:effectLst/>
+                <a:latin typeface="Nunito" pitchFamily="2" charset="0"/>
+              </a:rPr>
+              <a:t>Or </a:t>
+            </a:r>
+            <a:r>
+              <a:rPr lang="en-GB" sz="1800" b="0" i="0" u="none" strike="noStrike" dirty="0" err="1">
+                <a:solidFill>
+                  <a:srgbClr val="212529"/>
+                </a:solidFill>
+                <a:effectLst/>
+                <a:latin typeface="Nunito" pitchFamily="2" charset="0"/>
+              </a:rPr>
+              <a:t>xpath</a:t>
+            </a:r>
+            <a:r>
+              <a:rPr lang="en-GB" sz="1800" b="0" i="0" u="none" strike="noStrike">
+                <a:solidFill>
+                  <a:srgbClr val="212529"/>
+                </a:solidFill>
+                <a:effectLst/>
+                <a:latin typeface="Nunito" pitchFamily="2" charset="0"/>
+              </a:rPr>
+              <a:t>= //*[@id="LoginID"]</a:t>
+            </a:r>
+            <a:br>
+              <a:rPr lang="en-GB" sz="1800" b="0" i="0" u="none" strike="noStrike" dirty="0">
+                <a:solidFill>
+                  <a:srgbClr val="212529"/>
+                </a:solidFill>
+                <a:effectLst/>
+                <a:latin typeface="Nunito" pitchFamily="2" charset="0"/>
+              </a:rPr>
+            </a:br>
+            <a:br>
+              <a:rPr lang="en-IN" sz="1800" dirty="0">
+                <a:solidFill>
+                  <a:srgbClr val="222222"/>
+                </a:solidFill>
+                <a:latin typeface="Source Sans Pro" panose="020B0503030403020204" pitchFamily="34" charset="0"/>
+              </a:rPr>
+            </a:br>
+            <a:br>
+              <a:rPr lang="en-IN" sz="1800" dirty="0">
+                <a:solidFill>
+                  <a:srgbClr val="222222"/>
+                </a:solidFill>
+                <a:latin typeface="Source Sans Pro" panose="020B0503030403020204" pitchFamily="34" charset="0"/>
+              </a:rPr>
+            </a:br>
+            <a:br>
+              <a:rPr lang="en-IN" sz="1800" dirty="0">
+                <a:solidFill>
+                  <a:srgbClr val="222222"/>
+                </a:solidFill>
+                <a:latin typeface="Source Sans Pro" panose="020B0503030403020204" pitchFamily="34" charset="0"/>
+              </a:rPr>
+            </a:br>
+            <a:br>
+              <a:rPr lang="en-IN" sz="1800" dirty="0">
+                <a:solidFill>
+                  <a:srgbClr val="222222"/>
+                </a:solidFill>
+                <a:latin typeface="Source Sans Pro" panose="020B0503030403020204" pitchFamily="34" charset="0"/>
+              </a:rPr>
+            </a:br>
+            <a:endParaRPr lang="en-GB" sz="1800" dirty="0">
+              <a:solidFill>
+                <a:srgbClr val="222222"/>
+              </a:solidFill>
+              <a:latin typeface="Source Sans Pro" panose="020B0503030403020204" pitchFamily="34" charset="0"/>
+            </a:endParaRPr>
+          </a:p>
+        </p:txBody>
+      </p:sp>
+      <p:graphicFrame>
+        <p:nvGraphicFramePr>
+          <p:cNvPr id="6" name="Table 5">
+            <a:extLst>
+              <a:ext uri="{FF2B5EF4-FFF2-40B4-BE49-F238E27FC236}">
+                <a16:creationId xmlns:a16="http://schemas.microsoft.com/office/drawing/2014/main" id="{F3522622-4181-8018-7E65-2E71CD74F241}"/>
+              </a:ext>
+            </a:extLst>
+          </p:cNvPr>
+          <p:cNvGraphicFramePr>
+            <a:graphicFrameLocks noGrp="1"/>
+          </p:cNvGraphicFramePr>
+          <p:nvPr>
+            <p:extLst>
+              <p:ext uri="{D42A27DB-BD31-4B8C-83A1-F6EECF244321}">
+                <p14:modId xmlns:p14="http://schemas.microsoft.com/office/powerpoint/2010/main" val="660264929"/>
+              </p:ext>
+            </p:extLst>
+          </p:nvPr>
+        </p:nvGraphicFramePr>
+        <p:xfrm>
+          <a:off x="805548" y="4163627"/>
+          <a:ext cx="9297240" cy="2299082"/>
+        </p:xfrm>
+        <a:graphic>
+          <a:graphicData uri="http://schemas.openxmlformats.org/drawingml/2006/table">
+            <a:tbl>
+              <a:tblPr/>
+              <a:tblGrid>
+                <a:gridCol w="1502008">
+                  <a:extLst>
+                    <a:ext uri="{9D8B030D-6E8A-4147-A177-3AD203B41FA5}">
+                      <a16:colId xmlns:a16="http://schemas.microsoft.com/office/drawing/2014/main" val="4004876974"/>
+                    </a:ext>
+                  </a:extLst>
+                </a:gridCol>
+                <a:gridCol w="4182807">
+                  <a:extLst>
+                    <a:ext uri="{9D8B030D-6E8A-4147-A177-3AD203B41FA5}">
+                      <a16:colId xmlns:a16="http://schemas.microsoft.com/office/drawing/2014/main" val="1437156677"/>
+                    </a:ext>
+                  </a:extLst>
+                </a:gridCol>
+                <a:gridCol w="3612425">
+                  <a:extLst>
+                    <a:ext uri="{9D8B030D-6E8A-4147-A177-3AD203B41FA5}">
+                      <a16:colId xmlns:a16="http://schemas.microsoft.com/office/drawing/2014/main" val="48907733"/>
+                    </a:ext>
+                  </a:extLst>
+                </a:gridCol>
+              </a:tblGrid>
+              <a:tr h="328474">
+                <a:tc>
+                  <a:txBody>
+                    <a:bodyPr/>
+                    <a:lstStyle/>
+                    <a:p>
+                      <a:pPr algn="ctr" fontAlgn="t"/>
+                      <a:r>
+                        <a:rPr lang="en-GB" sz="900" b="1" i="0" u="none" strike="noStrike">
+                          <a:solidFill>
+                            <a:srgbClr val="212529"/>
+                          </a:solidFill>
+                          <a:effectLst/>
+                          <a:latin typeface="Nunito" pitchFamily="2" charset="0"/>
+                        </a:rPr>
+                        <a:t>Method</a:t>
+                      </a:r>
+                    </a:p>
+                  </a:txBody>
+                  <a:tcPr marL="7620" marR="7620" marT="7620" marB="0">
+                    <a:lnL w="6350" cap="flat" cmpd="sng" algn="ctr">
+                      <a:solidFill>
+                        <a:srgbClr val="000000"/>
+                      </a:solidFill>
+                      <a:prstDash val="solid"/>
+                      <a:round/>
+                      <a:headEnd type="none" w="med" len="med"/>
+                      <a:tailEnd type="none" w="med" len="med"/>
+                    </a:lnL>
+                    <a:lnR w="6350" cap="flat" cmpd="sng" algn="ctr">
+                      <a:solidFill>
+                        <a:srgbClr val="000000"/>
+                      </a:solidFill>
+                      <a:prstDash val="solid"/>
+                      <a:round/>
+                      <a:headEnd type="none" w="med" len="med"/>
+                      <a:tailEnd type="none" w="med" len="med"/>
+                    </a:lnR>
+                    <a:lnT w="6350" cap="flat" cmpd="sng" algn="ctr">
+                      <a:solidFill>
+                        <a:srgbClr val="000000"/>
+                      </a:solidFill>
+                      <a:prstDash val="solid"/>
+                      <a:round/>
+                      <a:headEnd type="none" w="med" len="med"/>
+                      <a:tailEnd type="none" w="med" len="med"/>
+                    </a:lnT>
+                    <a:lnB w="6350" cap="flat" cmpd="sng" algn="ctr">
+                      <a:solidFill>
+                        <a:srgbClr val="000000"/>
+                      </a:solidFill>
+                      <a:prstDash val="solid"/>
+                      <a:round/>
+                      <a:headEnd type="none" w="med" len="med"/>
+                      <a:tailEnd type="none" w="med" len="med"/>
+                    </a:lnB>
+                    <a:solidFill>
+                      <a:srgbClr val="EEEEEE"/>
+                    </a:solidFill>
+                  </a:tcPr>
+                </a:tc>
+                <a:tc>
+                  <a:txBody>
+                    <a:bodyPr/>
+                    <a:lstStyle/>
+                    <a:p>
+                      <a:pPr algn="ctr" fontAlgn="t"/>
+                      <a:r>
+                        <a:rPr lang="en-GB" sz="900" b="1" i="0" u="none" strike="noStrike">
+                          <a:solidFill>
+                            <a:srgbClr val="212529"/>
+                          </a:solidFill>
+                          <a:effectLst/>
+                          <a:latin typeface="Nunito" pitchFamily="2" charset="0"/>
+                        </a:rPr>
+                        <a:t>Syntax</a:t>
+                      </a:r>
+                    </a:p>
+                  </a:txBody>
+                  <a:tcPr marL="7620" marR="7620" marT="7620" marB="0">
+                    <a:lnL w="6350" cap="flat" cmpd="sng" algn="ctr">
+                      <a:solidFill>
+                        <a:srgbClr val="000000"/>
+                      </a:solidFill>
+                      <a:prstDash val="solid"/>
+                      <a:round/>
+                      <a:headEnd type="none" w="med" len="med"/>
+                      <a:tailEnd type="none" w="med" len="med"/>
+                    </a:lnL>
+                    <a:lnR w="6350" cap="flat" cmpd="sng" algn="ctr">
+                      <a:solidFill>
+                        <a:srgbClr val="000000"/>
+                      </a:solidFill>
+                      <a:prstDash val="solid"/>
+                      <a:round/>
+                      <a:headEnd type="none" w="med" len="med"/>
+                      <a:tailEnd type="none" w="med" len="med"/>
+                    </a:lnR>
+                    <a:lnT w="6350" cap="flat" cmpd="sng" algn="ctr">
+                      <a:solidFill>
+                        <a:srgbClr val="000000"/>
+                      </a:solidFill>
+                      <a:prstDash val="solid"/>
+                      <a:round/>
+                      <a:headEnd type="none" w="med" len="med"/>
+                      <a:tailEnd type="none" w="med" len="med"/>
+                    </a:lnT>
+                    <a:lnB w="6350" cap="flat" cmpd="sng" algn="ctr">
+                      <a:solidFill>
+                        <a:srgbClr val="000000"/>
+                      </a:solidFill>
+                      <a:prstDash val="solid"/>
+                      <a:round/>
+                      <a:headEnd type="none" w="med" len="med"/>
+                      <a:tailEnd type="none" w="med" len="med"/>
+                    </a:lnB>
+                    <a:solidFill>
+                      <a:srgbClr val="EEEEEE"/>
+                    </a:solidFill>
+                  </a:tcPr>
+                </a:tc>
+                <a:tc>
+                  <a:txBody>
+                    <a:bodyPr/>
+                    <a:lstStyle/>
+                    <a:p>
+                      <a:pPr algn="ctr" fontAlgn="t"/>
+                      <a:r>
+                        <a:rPr lang="en-GB" sz="900" b="1" i="0" u="none" strike="noStrike">
+                          <a:solidFill>
+                            <a:srgbClr val="212529"/>
+                          </a:solidFill>
+                          <a:effectLst/>
+                          <a:latin typeface="Nunito" pitchFamily="2" charset="0"/>
+                        </a:rPr>
+                        <a:t>Description</a:t>
+                      </a:r>
+                    </a:p>
+                  </a:txBody>
+                  <a:tcPr marL="7620" marR="7620" marT="7620" marB="0">
+                    <a:lnL w="6350" cap="flat" cmpd="sng" algn="ctr">
+                      <a:solidFill>
+                        <a:srgbClr val="000000"/>
+                      </a:solidFill>
+                      <a:prstDash val="solid"/>
+                      <a:round/>
+                      <a:headEnd type="none" w="med" len="med"/>
+                      <a:tailEnd type="none" w="med" len="med"/>
+                    </a:lnL>
+                    <a:lnR w="6350" cap="flat" cmpd="sng" algn="ctr">
+                      <a:solidFill>
+                        <a:srgbClr val="000000"/>
+                      </a:solidFill>
+                      <a:prstDash val="solid"/>
+                      <a:round/>
+                      <a:headEnd type="none" w="med" len="med"/>
+                      <a:tailEnd type="none" w="med" len="med"/>
+                    </a:lnR>
+                    <a:lnT w="6350" cap="flat" cmpd="sng" algn="ctr">
+                      <a:solidFill>
+                        <a:srgbClr val="000000"/>
+                      </a:solidFill>
+                      <a:prstDash val="solid"/>
+                      <a:round/>
+                      <a:headEnd type="none" w="med" len="med"/>
+                      <a:tailEnd type="none" w="med" len="med"/>
+                    </a:lnT>
+                    <a:lnB w="6350" cap="flat" cmpd="sng" algn="ctr">
+                      <a:solidFill>
+                        <a:srgbClr val="000000"/>
+                      </a:solidFill>
+                      <a:prstDash val="solid"/>
+                      <a:round/>
+                      <a:headEnd type="none" w="med" len="med"/>
+                      <a:tailEnd type="none" w="med" len="med"/>
+                    </a:lnB>
+                    <a:solidFill>
+                      <a:srgbClr val="EEEEEE"/>
+                    </a:solidFill>
+                  </a:tcPr>
+                </a:tc>
+                <a:extLst>
+                  <a:ext uri="{0D108BD9-81ED-4DB2-BD59-A6C34878D82A}">
+                    <a16:rowId xmlns:a16="http://schemas.microsoft.com/office/drawing/2014/main" val="1425607142"/>
+                  </a:ext>
+                </a:extLst>
+              </a:tr>
+              <a:tr h="246326">
+                <a:tc>
+                  <a:txBody>
+                    <a:bodyPr/>
+                    <a:lstStyle/>
+                    <a:p>
+                      <a:pPr algn="l" fontAlgn="ctr"/>
+                      <a:r>
+                        <a:rPr lang="en-GB" sz="900" b="0" i="0" u="none" strike="noStrike" dirty="0">
+                          <a:solidFill>
+                            <a:srgbClr val="212529"/>
+                          </a:solidFill>
+                          <a:effectLst/>
+                          <a:latin typeface="Nunito" pitchFamily="2" charset="0"/>
+                        </a:rPr>
+                        <a:t>By ID</a:t>
+                      </a:r>
+                    </a:p>
+                  </a:txBody>
+                  <a:tcPr marL="7620" marR="7620" marT="7620" marB="0" anchor="ctr">
+                    <a:lnL w="6350" cap="flat" cmpd="sng" algn="ctr">
+                      <a:solidFill>
+                        <a:srgbClr val="000000"/>
+                      </a:solidFill>
+                      <a:prstDash val="solid"/>
+                      <a:round/>
+                      <a:headEnd type="none" w="med" len="med"/>
+                      <a:tailEnd type="none" w="med" len="med"/>
+                    </a:lnL>
+                    <a:lnR w="6350" cap="flat" cmpd="sng" algn="ctr">
+                      <a:solidFill>
+                        <a:srgbClr val="000000"/>
+                      </a:solidFill>
+                      <a:prstDash val="solid"/>
+                      <a:round/>
+                      <a:headEnd type="none" w="med" len="med"/>
+                      <a:tailEnd type="none" w="med" len="med"/>
+                    </a:lnR>
+                    <a:lnT w="6350" cap="flat" cmpd="sng" algn="ctr">
+                      <a:solidFill>
+                        <a:srgbClr val="000000"/>
+                      </a:solidFill>
+                      <a:prstDash val="solid"/>
+                      <a:round/>
+                      <a:headEnd type="none" w="med" len="med"/>
+                      <a:tailEnd type="none" w="med" len="med"/>
+                    </a:lnT>
+                    <a:lnB w="6350" cap="flat" cmpd="sng" algn="ctr">
+                      <a:solidFill>
+                        <a:srgbClr val="000000"/>
+                      </a:solidFill>
+                      <a:prstDash val="solid"/>
+                      <a:round/>
+                      <a:headEnd type="none" w="med" len="med"/>
+                      <a:tailEnd type="none" w="med" len="med"/>
+                    </a:lnB>
+                  </a:tcPr>
+                </a:tc>
+                <a:tc>
+                  <a:txBody>
+                    <a:bodyPr/>
+                    <a:lstStyle/>
+                    <a:p>
+                      <a:pPr algn="l" fontAlgn="t"/>
+                      <a:r>
+                        <a:rPr lang="en-GB" sz="900" b="0" i="0" u="none" strike="noStrike" dirty="0" err="1">
+                          <a:solidFill>
+                            <a:srgbClr val="212529"/>
+                          </a:solidFill>
+                          <a:effectLst/>
+                          <a:latin typeface="Nunito" pitchFamily="2" charset="0"/>
+                        </a:rPr>
+                        <a:t>driver.findElement</a:t>
+                      </a:r>
+                      <a:r>
+                        <a:rPr lang="en-GB" sz="900" b="0" i="0" u="none" strike="noStrike" dirty="0">
+                          <a:solidFill>
+                            <a:srgbClr val="212529"/>
+                          </a:solidFill>
+                          <a:effectLst/>
+                          <a:latin typeface="Nunito" pitchFamily="2" charset="0"/>
+                        </a:rPr>
+                        <a:t>(By.id (&lt;element ID&gt;))</a:t>
+                      </a:r>
+                    </a:p>
+                  </a:txBody>
+                  <a:tcPr marL="7620" marR="7620" marT="7620" marB="0">
+                    <a:lnL w="6350" cap="flat" cmpd="sng" algn="ctr">
+                      <a:solidFill>
+                        <a:srgbClr val="000000"/>
+                      </a:solidFill>
+                      <a:prstDash val="solid"/>
+                      <a:round/>
+                      <a:headEnd type="none" w="med" len="med"/>
+                      <a:tailEnd type="none" w="med" len="med"/>
+                    </a:lnL>
+                    <a:lnR w="6350" cap="flat" cmpd="sng" algn="ctr">
+                      <a:solidFill>
+                        <a:srgbClr val="000000"/>
+                      </a:solidFill>
+                      <a:prstDash val="solid"/>
+                      <a:round/>
+                      <a:headEnd type="none" w="med" len="med"/>
+                      <a:tailEnd type="none" w="med" len="med"/>
+                    </a:lnR>
+                    <a:lnT w="6350" cap="flat" cmpd="sng" algn="ctr">
+                      <a:solidFill>
+                        <a:srgbClr val="000000"/>
+                      </a:solidFill>
+                      <a:prstDash val="solid"/>
+                      <a:round/>
+                      <a:headEnd type="none" w="med" len="med"/>
+                      <a:tailEnd type="none" w="med" len="med"/>
+                    </a:lnT>
+                    <a:lnB w="6350" cap="flat" cmpd="sng" algn="ctr">
+                      <a:solidFill>
+                        <a:srgbClr val="000000"/>
+                      </a:solidFill>
+                      <a:prstDash val="solid"/>
+                      <a:round/>
+                      <a:headEnd type="none" w="med" len="med"/>
+                      <a:tailEnd type="none" w="med" len="med"/>
+                    </a:lnB>
+                  </a:tcPr>
+                </a:tc>
+                <a:tc>
+                  <a:txBody>
+                    <a:bodyPr/>
+                    <a:lstStyle/>
+                    <a:p>
+                      <a:pPr algn="l" fontAlgn="t"/>
+                      <a:r>
+                        <a:rPr lang="en-IN" sz="900" b="0" i="0" u="none" strike="noStrike">
+                          <a:solidFill>
+                            <a:srgbClr val="212529"/>
+                          </a:solidFill>
+                          <a:effectLst/>
+                          <a:latin typeface="Nunito" pitchFamily="2" charset="0"/>
+                        </a:rPr>
+                        <a:t>Locates an element using the ID attribute</a:t>
+                      </a:r>
+                    </a:p>
+                  </a:txBody>
+                  <a:tcPr marL="7620" marR="7620" marT="7620" marB="0">
+                    <a:lnL w="6350" cap="flat" cmpd="sng" algn="ctr">
+                      <a:solidFill>
+                        <a:srgbClr val="000000"/>
+                      </a:solidFill>
+                      <a:prstDash val="solid"/>
+                      <a:round/>
+                      <a:headEnd type="none" w="med" len="med"/>
+                      <a:tailEnd type="none" w="med" len="med"/>
+                    </a:lnL>
+                    <a:lnR w="6350" cap="flat" cmpd="sng" algn="ctr">
+                      <a:solidFill>
+                        <a:srgbClr val="000000"/>
+                      </a:solidFill>
+                      <a:prstDash val="solid"/>
+                      <a:round/>
+                      <a:headEnd type="none" w="med" len="med"/>
+                      <a:tailEnd type="none" w="med" len="med"/>
+                    </a:lnR>
+                    <a:lnT w="6350" cap="flat" cmpd="sng" algn="ctr">
+                      <a:solidFill>
+                        <a:srgbClr val="000000"/>
+                      </a:solidFill>
+                      <a:prstDash val="solid"/>
+                      <a:round/>
+                      <a:headEnd type="none" w="med" len="med"/>
+                      <a:tailEnd type="none" w="med" len="med"/>
+                    </a:lnT>
+                    <a:lnB w="6350" cap="flat" cmpd="sng" algn="ctr">
+                      <a:solidFill>
+                        <a:srgbClr val="000000"/>
+                      </a:solidFill>
+                      <a:prstDash val="solid"/>
+                      <a:round/>
+                      <a:headEnd type="none" w="med" len="med"/>
+                      <a:tailEnd type="none" w="med" len="med"/>
+                    </a:lnB>
+                  </a:tcPr>
+                </a:tc>
+                <a:extLst>
+                  <a:ext uri="{0D108BD9-81ED-4DB2-BD59-A6C34878D82A}">
+                    <a16:rowId xmlns:a16="http://schemas.microsoft.com/office/drawing/2014/main" val="658793618"/>
+                  </a:ext>
+                </a:extLst>
+              </a:tr>
+              <a:tr h="246326">
+                <a:tc>
+                  <a:txBody>
+                    <a:bodyPr/>
+                    <a:lstStyle/>
+                    <a:p>
+                      <a:pPr algn="l" fontAlgn="ctr"/>
+                      <a:r>
+                        <a:rPr lang="en-GB" sz="900" b="0" i="0" u="none" strike="noStrike" dirty="0">
+                          <a:solidFill>
+                            <a:srgbClr val="212529"/>
+                          </a:solidFill>
+                          <a:effectLst/>
+                          <a:latin typeface="Nunito" pitchFamily="2" charset="0"/>
+                        </a:rPr>
+                        <a:t>By name</a:t>
+                      </a:r>
+                    </a:p>
+                  </a:txBody>
+                  <a:tcPr marL="7620" marR="7620" marT="7620" marB="0" anchor="ctr">
+                    <a:lnL w="6350" cap="flat" cmpd="sng" algn="ctr">
+                      <a:solidFill>
+                        <a:srgbClr val="000000"/>
+                      </a:solidFill>
+                      <a:prstDash val="solid"/>
+                      <a:round/>
+                      <a:headEnd type="none" w="med" len="med"/>
+                      <a:tailEnd type="none" w="med" len="med"/>
+                    </a:lnL>
+                    <a:lnR w="6350" cap="flat" cmpd="sng" algn="ctr">
+                      <a:solidFill>
+                        <a:srgbClr val="000000"/>
+                      </a:solidFill>
+                      <a:prstDash val="solid"/>
+                      <a:round/>
+                      <a:headEnd type="none" w="med" len="med"/>
+                      <a:tailEnd type="none" w="med" len="med"/>
+                    </a:lnR>
+                    <a:lnT w="6350" cap="flat" cmpd="sng" algn="ctr">
+                      <a:solidFill>
+                        <a:srgbClr val="000000"/>
+                      </a:solidFill>
+                      <a:prstDash val="solid"/>
+                      <a:round/>
+                      <a:headEnd type="none" w="med" len="med"/>
+                      <a:tailEnd type="none" w="med" len="med"/>
+                    </a:lnT>
+                    <a:lnB w="6350" cap="flat" cmpd="sng" algn="ctr">
+                      <a:solidFill>
+                        <a:srgbClr val="000000"/>
+                      </a:solidFill>
+                      <a:prstDash val="solid"/>
+                      <a:round/>
+                      <a:headEnd type="none" w="med" len="med"/>
+                      <a:tailEnd type="none" w="med" len="med"/>
+                    </a:lnB>
+                  </a:tcPr>
+                </a:tc>
+                <a:tc>
+                  <a:txBody>
+                    <a:bodyPr/>
+                    <a:lstStyle/>
+                    <a:p>
+                      <a:pPr algn="l" fontAlgn="ctr"/>
+                      <a:r>
+                        <a:rPr lang="en-GB" sz="900" b="0" i="0" u="none" strike="noStrike">
+                          <a:solidFill>
+                            <a:srgbClr val="212529"/>
+                          </a:solidFill>
+                          <a:effectLst/>
+                          <a:latin typeface="Nunito" pitchFamily="2" charset="0"/>
+                        </a:rPr>
+                        <a:t>driver.findElement(By.name (&lt;element name&gt;))</a:t>
+                      </a:r>
+                    </a:p>
+                  </a:txBody>
+                  <a:tcPr marL="7620" marR="7620" marT="7620" marB="0" anchor="ctr">
+                    <a:lnL w="6350" cap="flat" cmpd="sng" algn="ctr">
+                      <a:solidFill>
+                        <a:srgbClr val="000000"/>
+                      </a:solidFill>
+                      <a:prstDash val="solid"/>
+                      <a:round/>
+                      <a:headEnd type="none" w="med" len="med"/>
+                      <a:tailEnd type="none" w="med" len="med"/>
+                    </a:lnL>
+                    <a:lnR w="6350" cap="flat" cmpd="sng" algn="ctr">
+                      <a:solidFill>
+                        <a:srgbClr val="000000"/>
+                      </a:solidFill>
+                      <a:prstDash val="solid"/>
+                      <a:round/>
+                      <a:headEnd type="none" w="med" len="med"/>
+                      <a:tailEnd type="none" w="med" len="med"/>
+                    </a:lnR>
+                    <a:lnT w="6350" cap="flat" cmpd="sng" algn="ctr">
+                      <a:solidFill>
+                        <a:srgbClr val="000000"/>
+                      </a:solidFill>
+                      <a:prstDash val="solid"/>
+                      <a:round/>
+                      <a:headEnd type="none" w="med" len="med"/>
+                      <a:tailEnd type="none" w="med" len="med"/>
+                    </a:lnT>
+                    <a:lnB w="6350" cap="flat" cmpd="sng" algn="ctr">
+                      <a:solidFill>
+                        <a:srgbClr val="000000"/>
+                      </a:solidFill>
+                      <a:prstDash val="solid"/>
+                      <a:round/>
+                      <a:headEnd type="none" w="med" len="med"/>
+                      <a:tailEnd type="none" w="med" len="med"/>
+                    </a:lnB>
+                  </a:tcPr>
+                </a:tc>
+                <a:tc>
+                  <a:txBody>
+                    <a:bodyPr/>
+                    <a:lstStyle/>
+                    <a:p>
+                      <a:pPr algn="l" fontAlgn="t"/>
+                      <a:r>
+                        <a:rPr lang="en-IN" sz="900" b="0" i="0" u="none" strike="noStrike">
+                          <a:solidFill>
+                            <a:srgbClr val="212529"/>
+                          </a:solidFill>
+                          <a:effectLst/>
+                          <a:latin typeface="Nunito" pitchFamily="2" charset="0"/>
+                        </a:rPr>
+                        <a:t>Locates an element using the Name attribute</a:t>
+                      </a:r>
+                    </a:p>
+                  </a:txBody>
+                  <a:tcPr marL="7620" marR="7620" marT="7620" marB="0">
+                    <a:lnL w="6350" cap="flat" cmpd="sng" algn="ctr">
+                      <a:solidFill>
+                        <a:srgbClr val="000000"/>
+                      </a:solidFill>
+                      <a:prstDash val="solid"/>
+                      <a:round/>
+                      <a:headEnd type="none" w="med" len="med"/>
+                      <a:tailEnd type="none" w="med" len="med"/>
+                    </a:lnL>
+                    <a:lnR w="6350" cap="flat" cmpd="sng" algn="ctr">
+                      <a:solidFill>
+                        <a:srgbClr val="000000"/>
+                      </a:solidFill>
+                      <a:prstDash val="solid"/>
+                      <a:round/>
+                      <a:headEnd type="none" w="med" len="med"/>
+                      <a:tailEnd type="none" w="med" len="med"/>
+                    </a:lnR>
+                    <a:lnT w="6350" cap="flat" cmpd="sng" algn="ctr">
+                      <a:solidFill>
+                        <a:srgbClr val="000000"/>
+                      </a:solidFill>
+                      <a:prstDash val="solid"/>
+                      <a:round/>
+                      <a:headEnd type="none" w="med" len="med"/>
+                      <a:tailEnd type="none" w="med" len="med"/>
+                    </a:lnT>
+                    <a:lnB w="6350" cap="flat" cmpd="sng" algn="ctr">
+                      <a:solidFill>
+                        <a:srgbClr val="000000"/>
+                      </a:solidFill>
+                      <a:prstDash val="solid"/>
+                      <a:round/>
+                      <a:headEnd type="none" w="med" len="med"/>
+                      <a:tailEnd type="none" w="med" len="med"/>
+                    </a:lnB>
+                  </a:tcPr>
+                </a:tc>
+                <a:extLst>
+                  <a:ext uri="{0D108BD9-81ED-4DB2-BD59-A6C34878D82A}">
+                    <a16:rowId xmlns:a16="http://schemas.microsoft.com/office/drawing/2014/main" val="3761673847"/>
+                  </a:ext>
+                </a:extLst>
+              </a:tr>
+              <a:tr h="246326">
+                <a:tc>
+                  <a:txBody>
+                    <a:bodyPr/>
+                    <a:lstStyle/>
+                    <a:p>
+                      <a:pPr algn="l" fontAlgn="ctr"/>
+                      <a:r>
+                        <a:rPr lang="en-GB" sz="900" b="0" i="0" u="none" strike="noStrike" dirty="0">
+                          <a:solidFill>
+                            <a:srgbClr val="212529"/>
+                          </a:solidFill>
+                          <a:effectLst/>
+                          <a:latin typeface="Nunito" pitchFamily="2" charset="0"/>
+                        </a:rPr>
+                        <a:t>By class name</a:t>
+                      </a:r>
+                    </a:p>
+                  </a:txBody>
+                  <a:tcPr marL="7620" marR="7620" marT="7620" marB="0" anchor="ctr">
+                    <a:lnL w="6350" cap="flat" cmpd="sng" algn="ctr">
+                      <a:solidFill>
+                        <a:srgbClr val="000000"/>
+                      </a:solidFill>
+                      <a:prstDash val="solid"/>
+                      <a:round/>
+                      <a:headEnd type="none" w="med" len="med"/>
+                      <a:tailEnd type="none" w="med" len="med"/>
+                    </a:lnL>
+                    <a:lnR w="6350" cap="flat" cmpd="sng" algn="ctr">
+                      <a:solidFill>
+                        <a:srgbClr val="000000"/>
+                      </a:solidFill>
+                      <a:prstDash val="solid"/>
+                      <a:round/>
+                      <a:headEnd type="none" w="med" len="med"/>
+                      <a:tailEnd type="none" w="med" len="med"/>
+                    </a:lnR>
+                    <a:lnT w="6350" cap="flat" cmpd="sng" algn="ctr">
+                      <a:solidFill>
+                        <a:srgbClr val="000000"/>
+                      </a:solidFill>
+                      <a:prstDash val="solid"/>
+                      <a:round/>
+                      <a:headEnd type="none" w="med" len="med"/>
+                      <a:tailEnd type="none" w="med" len="med"/>
+                    </a:lnT>
+                    <a:lnB w="6350" cap="flat" cmpd="sng" algn="ctr">
+                      <a:solidFill>
+                        <a:srgbClr val="000000"/>
+                      </a:solidFill>
+                      <a:prstDash val="solid"/>
+                      <a:round/>
+                      <a:headEnd type="none" w="med" len="med"/>
+                      <a:tailEnd type="none" w="med" len="med"/>
+                    </a:lnB>
+                  </a:tcPr>
+                </a:tc>
+                <a:tc>
+                  <a:txBody>
+                    <a:bodyPr/>
+                    <a:lstStyle/>
+                    <a:p>
+                      <a:pPr algn="l" fontAlgn="t"/>
+                      <a:r>
+                        <a:rPr lang="en-IN" sz="900" b="0" i="0" u="none" strike="noStrike">
+                          <a:solidFill>
+                            <a:srgbClr val="212529"/>
+                          </a:solidFill>
+                          <a:effectLst/>
+                          <a:latin typeface="Nunito" pitchFamily="2" charset="0"/>
+                        </a:rPr>
+                        <a:t>driver.findElement(By.className (&lt;element class&gt;))</a:t>
+                      </a:r>
+                    </a:p>
+                  </a:txBody>
+                  <a:tcPr marL="7620" marR="7620" marT="7620" marB="0">
+                    <a:lnL w="6350" cap="flat" cmpd="sng" algn="ctr">
+                      <a:solidFill>
+                        <a:srgbClr val="000000"/>
+                      </a:solidFill>
+                      <a:prstDash val="solid"/>
+                      <a:round/>
+                      <a:headEnd type="none" w="med" len="med"/>
+                      <a:tailEnd type="none" w="med" len="med"/>
+                    </a:lnL>
+                    <a:lnR w="6350" cap="flat" cmpd="sng" algn="ctr">
+                      <a:solidFill>
+                        <a:srgbClr val="000000"/>
+                      </a:solidFill>
+                      <a:prstDash val="solid"/>
+                      <a:round/>
+                      <a:headEnd type="none" w="med" len="med"/>
+                      <a:tailEnd type="none" w="med" len="med"/>
+                    </a:lnR>
+                    <a:lnT w="6350" cap="flat" cmpd="sng" algn="ctr">
+                      <a:solidFill>
+                        <a:srgbClr val="000000"/>
+                      </a:solidFill>
+                      <a:prstDash val="solid"/>
+                      <a:round/>
+                      <a:headEnd type="none" w="med" len="med"/>
+                      <a:tailEnd type="none" w="med" len="med"/>
+                    </a:lnT>
+                    <a:lnB w="6350" cap="flat" cmpd="sng" algn="ctr">
+                      <a:solidFill>
+                        <a:srgbClr val="000000"/>
+                      </a:solidFill>
+                      <a:prstDash val="solid"/>
+                      <a:round/>
+                      <a:headEnd type="none" w="med" len="med"/>
+                      <a:tailEnd type="none" w="med" len="med"/>
+                    </a:lnB>
+                  </a:tcPr>
+                </a:tc>
+                <a:tc>
+                  <a:txBody>
+                    <a:bodyPr/>
+                    <a:lstStyle/>
+                    <a:p>
+                      <a:pPr algn="l" fontAlgn="t"/>
+                      <a:r>
+                        <a:rPr lang="en-IN" sz="900" b="0" i="0" u="none" strike="noStrike">
+                          <a:solidFill>
+                            <a:srgbClr val="212529"/>
+                          </a:solidFill>
+                          <a:effectLst/>
+                          <a:latin typeface="Nunito" pitchFamily="2" charset="0"/>
+                        </a:rPr>
+                        <a:t>Locates an element using the Class attribute</a:t>
+                      </a:r>
+                    </a:p>
+                  </a:txBody>
+                  <a:tcPr marL="7620" marR="7620" marT="7620" marB="0">
+                    <a:lnL w="6350" cap="flat" cmpd="sng" algn="ctr">
+                      <a:solidFill>
+                        <a:srgbClr val="000000"/>
+                      </a:solidFill>
+                      <a:prstDash val="solid"/>
+                      <a:round/>
+                      <a:headEnd type="none" w="med" len="med"/>
+                      <a:tailEnd type="none" w="med" len="med"/>
+                    </a:lnL>
+                    <a:lnR w="6350" cap="flat" cmpd="sng" algn="ctr">
+                      <a:solidFill>
+                        <a:srgbClr val="000000"/>
+                      </a:solidFill>
+                      <a:prstDash val="solid"/>
+                      <a:round/>
+                      <a:headEnd type="none" w="med" len="med"/>
+                      <a:tailEnd type="none" w="med" len="med"/>
+                    </a:lnR>
+                    <a:lnT w="6350" cap="flat" cmpd="sng" algn="ctr">
+                      <a:solidFill>
+                        <a:srgbClr val="000000"/>
+                      </a:solidFill>
+                      <a:prstDash val="solid"/>
+                      <a:round/>
+                      <a:headEnd type="none" w="med" len="med"/>
+                      <a:tailEnd type="none" w="med" len="med"/>
+                    </a:lnT>
+                    <a:lnB w="6350" cap="flat" cmpd="sng" algn="ctr">
+                      <a:solidFill>
+                        <a:srgbClr val="000000"/>
+                      </a:solidFill>
+                      <a:prstDash val="solid"/>
+                      <a:round/>
+                      <a:headEnd type="none" w="med" len="med"/>
+                      <a:tailEnd type="none" w="med" len="med"/>
+                    </a:lnB>
+                  </a:tcPr>
+                </a:tc>
+                <a:extLst>
+                  <a:ext uri="{0D108BD9-81ED-4DB2-BD59-A6C34878D82A}">
+                    <a16:rowId xmlns:a16="http://schemas.microsoft.com/office/drawing/2014/main" val="2223708920"/>
+                  </a:ext>
+                </a:extLst>
+              </a:tr>
+              <a:tr h="246326">
+                <a:tc>
+                  <a:txBody>
+                    <a:bodyPr/>
+                    <a:lstStyle/>
+                    <a:p>
+                      <a:pPr algn="l" fontAlgn="ctr"/>
+                      <a:r>
+                        <a:rPr lang="en-GB" sz="900" b="0" i="0" u="none" strike="noStrike">
+                          <a:solidFill>
+                            <a:srgbClr val="212529"/>
+                          </a:solidFill>
+                          <a:effectLst/>
+                          <a:latin typeface="Nunito" pitchFamily="2" charset="0"/>
+                        </a:rPr>
+                        <a:t>By tag name</a:t>
+                      </a:r>
+                    </a:p>
+                  </a:txBody>
+                  <a:tcPr marL="7620" marR="7620" marT="7620" marB="0" anchor="ctr">
+                    <a:lnL w="6350" cap="flat" cmpd="sng" algn="ctr">
+                      <a:solidFill>
+                        <a:srgbClr val="000000"/>
+                      </a:solidFill>
+                      <a:prstDash val="solid"/>
+                      <a:round/>
+                      <a:headEnd type="none" w="med" len="med"/>
+                      <a:tailEnd type="none" w="med" len="med"/>
+                    </a:lnL>
+                    <a:lnR w="6350" cap="flat" cmpd="sng" algn="ctr">
+                      <a:solidFill>
+                        <a:srgbClr val="000000"/>
+                      </a:solidFill>
+                      <a:prstDash val="solid"/>
+                      <a:round/>
+                      <a:headEnd type="none" w="med" len="med"/>
+                      <a:tailEnd type="none" w="med" len="med"/>
+                    </a:lnR>
+                    <a:lnT w="6350" cap="flat" cmpd="sng" algn="ctr">
+                      <a:solidFill>
+                        <a:srgbClr val="000000"/>
+                      </a:solidFill>
+                      <a:prstDash val="solid"/>
+                      <a:round/>
+                      <a:headEnd type="none" w="med" len="med"/>
+                      <a:tailEnd type="none" w="med" len="med"/>
+                    </a:lnT>
+                    <a:lnB w="6350" cap="flat" cmpd="sng" algn="ctr">
+                      <a:solidFill>
+                        <a:srgbClr val="000000"/>
+                      </a:solidFill>
+                      <a:prstDash val="solid"/>
+                      <a:round/>
+                      <a:headEnd type="none" w="med" len="med"/>
+                      <a:tailEnd type="none" w="med" len="med"/>
+                    </a:lnB>
+                  </a:tcPr>
+                </a:tc>
+                <a:tc>
+                  <a:txBody>
+                    <a:bodyPr/>
+                    <a:lstStyle/>
+                    <a:p>
+                      <a:pPr algn="l" fontAlgn="t"/>
+                      <a:r>
+                        <a:rPr lang="en-GB" sz="900" b="0" i="0" u="none" strike="noStrike">
+                          <a:solidFill>
+                            <a:srgbClr val="212529"/>
+                          </a:solidFill>
+                          <a:effectLst/>
+                          <a:latin typeface="Nunito" pitchFamily="2" charset="0"/>
+                        </a:rPr>
+                        <a:t>driver.findElement(By.tagName (&lt;htmltagname&gt;))</a:t>
+                      </a:r>
+                    </a:p>
+                  </a:txBody>
+                  <a:tcPr marL="7620" marR="7620" marT="7620" marB="0">
+                    <a:lnL w="6350" cap="flat" cmpd="sng" algn="ctr">
+                      <a:solidFill>
+                        <a:srgbClr val="000000"/>
+                      </a:solidFill>
+                      <a:prstDash val="solid"/>
+                      <a:round/>
+                      <a:headEnd type="none" w="med" len="med"/>
+                      <a:tailEnd type="none" w="med" len="med"/>
+                    </a:lnL>
+                    <a:lnR w="6350" cap="flat" cmpd="sng" algn="ctr">
+                      <a:solidFill>
+                        <a:srgbClr val="000000"/>
+                      </a:solidFill>
+                      <a:prstDash val="solid"/>
+                      <a:round/>
+                      <a:headEnd type="none" w="med" len="med"/>
+                      <a:tailEnd type="none" w="med" len="med"/>
+                    </a:lnR>
+                    <a:lnT w="6350" cap="flat" cmpd="sng" algn="ctr">
+                      <a:solidFill>
+                        <a:srgbClr val="000000"/>
+                      </a:solidFill>
+                      <a:prstDash val="solid"/>
+                      <a:round/>
+                      <a:headEnd type="none" w="med" len="med"/>
+                      <a:tailEnd type="none" w="med" len="med"/>
+                    </a:lnT>
+                    <a:lnB w="6350" cap="flat" cmpd="sng" algn="ctr">
+                      <a:solidFill>
+                        <a:srgbClr val="000000"/>
+                      </a:solidFill>
+                      <a:prstDash val="solid"/>
+                      <a:round/>
+                      <a:headEnd type="none" w="med" len="med"/>
+                      <a:tailEnd type="none" w="med" len="med"/>
+                    </a:lnB>
+                  </a:tcPr>
+                </a:tc>
+                <a:tc>
+                  <a:txBody>
+                    <a:bodyPr/>
+                    <a:lstStyle/>
+                    <a:p>
+                      <a:pPr algn="l" fontAlgn="t"/>
+                      <a:r>
+                        <a:rPr lang="en-IN" sz="900" b="0" i="0" u="none" strike="noStrike">
+                          <a:solidFill>
+                            <a:srgbClr val="212529"/>
+                          </a:solidFill>
+                          <a:effectLst/>
+                          <a:latin typeface="Nunito" pitchFamily="2" charset="0"/>
+                        </a:rPr>
+                        <a:t>Locates an element using the HTML tag</a:t>
+                      </a:r>
+                    </a:p>
+                  </a:txBody>
+                  <a:tcPr marL="7620" marR="7620" marT="7620" marB="0">
+                    <a:lnL w="6350" cap="flat" cmpd="sng" algn="ctr">
+                      <a:solidFill>
+                        <a:srgbClr val="000000"/>
+                      </a:solidFill>
+                      <a:prstDash val="solid"/>
+                      <a:round/>
+                      <a:headEnd type="none" w="med" len="med"/>
+                      <a:tailEnd type="none" w="med" len="med"/>
+                    </a:lnL>
+                    <a:lnR w="6350" cap="flat" cmpd="sng" algn="ctr">
+                      <a:solidFill>
+                        <a:srgbClr val="000000"/>
+                      </a:solidFill>
+                      <a:prstDash val="solid"/>
+                      <a:round/>
+                      <a:headEnd type="none" w="med" len="med"/>
+                      <a:tailEnd type="none" w="med" len="med"/>
+                    </a:lnR>
+                    <a:lnT w="6350" cap="flat" cmpd="sng" algn="ctr">
+                      <a:solidFill>
+                        <a:srgbClr val="000000"/>
+                      </a:solidFill>
+                      <a:prstDash val="solid"/>
+                      <a:round/>
+                      <a:headEnd type="none" w="med" len="med"/>
+                      <a:tailEnd type="none" w="med" len="med"/>
+                    </a:lnT>
+                    <a:lnB w="6350" cap="flat" cmpd="sng" algn="ctr">
+                      <a:solidFill>
+                        <a:srgbClr val="000000"/>
+                      </a:solidFill>
+                      <a:prstDash val="solid"/>
+                      <a:round/>
+                      <a:headEnd type="none" w="med" len="med"/>
+                      <a:tailEnd type="none" w="med" len="med"/>
+                    </a:lnB>
+                  </a:tcPr>
+                </a:tc>
+                <a:extLst>
+                  <a:ext uri="{0D108BD9-81ED-4DB2-BD59-A6C34878D82A}">
+                    <a16:rowId xmlns:a16="http://schemas.microsoft.com/office/drawing/2014/main" val="3569464761"/>
+                  </a:ext>
+                </a:extLst>
+              </a:tr>
+              <a:tr h="246326">
+                <a:tc>
+                  <a:txBody>
+                    <a:bodyPr/>
+                    <a:lstStyle/>
+                    <a:p>
+                      <a:pPr algn="l" fontAlgn="ctr"/>
+                      <a:r>
+                        <a:rPr lang="en-GB" sz="900" b="0" i="0" u="none" strike="noStrike">
+                          <a:solidFill>
+                            <a:srgbClr val="212529"/>
+                          </a:solidFill>
+                          <a:effectLst/>
+                          <a:latin typeface="Nunito" pitchFamily="2" charset="0"/>
+                        </a:rPr>
+                        <a:t>By link text</a:t>
+                      </a:r>
+                    </a:p>
+                  </a:txBody>
+                  <a:tcPr marL="7620" marR="7620" marT="7620" marB="0" anchor="ctr">
+                    <a:lnL w="6350" cap="flat" cmpd="sng" algn="ctr">
+                      <a:solidFill>
+                        <a:srgbClr val="000000"/>
+                      </a:solidFill>
+                      <a:prstDash val="solid"/>
+                      <a:round/>
+                      <a:headEnd type="none" w="med" len="med"/>
+                      <a:tailEnd type="none" w="med" len="med"/>
+                    </a:lnL>
+                    <a:lnR w="6350" cap="flat" cmpd="sng" algn="ctr">
+                      <a:solidFill>
+                        <a:srgbClr val="000000"/>
+                      </a:solidFill>
+                      <a:prstDash val="solid"/>
+                      <a:round/>
+                      <a:headEnd type="none" w="med" len="med"/>
+                      <a:tailEnd type="none" w="med" len="med"/>
+                    </a:lnR>
+                    <a:lnT w="6350" cap="flat" cmpd="sng" algn="ctr">
+                      <a:solidFill>
+                        <a:srgbClr val="000000"/>
+                      </a:solidFill>
+                      <a:prstDash val="solid"/>
+                      <a:round/>
+                      <a:headEnd type="none" w="med" len="med"/>
+                      <a:tailEnd type="none" w="med" len="med"/>
+                    </a:lnT>
+                    <a:lnB w="6350" cap="flat" cmpd="sng" algn="ctr">
+                      <a:solidFill>
+                        <a:srgbClr val="000000"/>
+                      </a:solidFill>
+                      <a:prstDash val="solid"/>
+                      <a:round/>
+                      <a:headEnd type="none" w="med" len="med"/>
+                      <a:tailEnd type="none" w="med" len="med"/>
+                    </a:lnB>
+                  </a:tcPr>
+                </a:tc>
+                <a:tc>
+                  <a:txBody>
+                    <a:bodyPr/>
+                    <a:lstStyle/>
+                    <a:p>
+                      <a:pPr algn="l" fontAlgn="t"/>
+                      <a:r>
+                        <a:rPr lang="en-GB" sz="900" b="0" i="0" u="none" strike="noStrike">
+                          <a:solidFill>
+                            <a:srgbClr val="212529"/>
+                          </a:solidFill>
+                          <a:effectLst/>
+                          <a:latin typeface="Nunito" pitchFamily="2" charset="0"/>
+                        </a:rPr>
+                        <a:t>driver.findElement(By.linkText (&lt;linktext&gt;))</a:t>
+                      </a:r>
+                    </a:p>
+                  </a:txBody>
+                  <a:tcPr marL="7620" marR="7620" marT="7620" marB="0">
+                    <a:lnL w="6350" cap="flat" cmpd="sng" algn="ctr">
+                      <a:solidFill>
+                        <a:srgbClr val="000000"/>
+                      </a:solidFill>
+                      <a:prstDash val="solid"/>
+                      <a:round/>
+                      <a:headEnd type="none" w="med" len="med"/>
+                      <a:tailEnd type="none" w="med" len="med"/>
+                    </a:lnL>
+                    <a:lnR w="6350" cap="flat" cmpd="sng" algn="ctr">
+                      <a:solidFill>
+                        <a:srgbClr val="000000"/>
+                      </a:solidFill>
+                      <a:prstDash val="solid"/>
+                      <a:round/>
+                      <a:headEnd type="none" w="med" len="med"/>
+                      <a:tailEnd type="none" w="med" len="med"/>
+                    </a:lnR>
+                    <a:lnT w="6350" cap="flat" cmpd="sng" algn="ctr">
+                      <a:solidFill>
+                        <a:srgbClr val="000000"/>
+                      </a:solidFill>
+                      <a:prstDash val="solid"/>
+                      <a:round/>
+                      <a:headEnd type="none" w="med" len="med"/>
+                      <a:tailEnd type="none" w="med" len="med"/>
+                    </a:lnT>
+                    <a:lnB w="6350" cap="flat" cmpd="sng" algn="ctr">
+                      <a:solidFill>
+                        <a:srgbClr val="000000"/>
+                      </a:solidFill>
+                      <a:prstDash val="solid"/>
+                      <a:round/>
+                      <a:headEnd type="none" w="med" len="med"/>
+                      <a:tailEnd type="none" w="med" len="med"/>
+                    </a:lnB>
+                  </a:tcPr>
+                </a:tc>
+                <a:tc>
+                  <a:txBody>
+                    <a:bodyPr/>
+                    <a:lstStyle/>
+                    <a:p>
+                      <a:pPr algn="l" fontAlgn="t"/>
+                      <a:r>
+                        <a:rPr lang="en-IN" sz="900" b="0" i="0" u="none" strike="noStrike">
+                          <a:solidFill>
+                            <a:srgbClr val="212529"/>
+                          </a:solidFill>
+                          <a:effectLst/>
+                          <a:latin typeface="Nunito" pitchFamily="2" charset="0"/>
+                        </a:rPr>
+                        <a:t>Locates a link using link text</a:t>
+                      </a:r>
+                    </a:p>
+                  </a:txBody>
+                  <a:tcPr marL="7620" marR="7620" marT="7620" marB="0">
+                    <a:lnL w="6350" cap="flat" cmpd="sng" algn="ctr">
+                      <a:solidFill>
+                        <a:srgbClr val="000000"/>
+                      </a:solidFill>
+                      <a:prstDash val="solid"/>
+                      <a:round/>
+                      <a:headEnd type="none" w="med" len="med"/>
+                      <a:tailEnd type="none" w="med" len="med"/>
+                    </a:lnL>
+                    <a:lnR w="6350" cap="flat" cmpd="sng" algn="ctr">
+                      <a:solidFill>
+                        <a:srgbClr val="000000"/>
+                      </a:solidFill>
+                      <a:prstDash val="solid"/>
+                      <a:round/>
+                      <a:headEnd type="none" w="med" len="med"/>
+                      <a:tailEnd type="none" w="med" len="med"/>
+                    </a:lnR>
+                    <a:lnT w="6350" cap="flat" cmpd="sng" algn="ctr">
+                      <a:solidFill>
+                        <a:srgbClr val="000000"/>
+                      </a:solidFill>
+                      <a:prstDash val="solid"/>
+                      <a:round/>
+                      <a:headEnd type="none" w="med" len="med"/>
+                      <a:tailEnd type="none" w="med" len="med"/>
+                    </a:lnT>
+                    <a:lnB w="6350" cap="flat" cmpd="sng" algn="ctr">
+                      <a:solidFill>
+                        <a:srgbClr val="000000"/>
+                      </a:solidFill>
+                      <a:prstDash val="solid"/>
+                      <a:round/>
+                      <a:headEnd type="none" w="med" len="med"/>
+                      <a:tailEnd type="none" w="med" len="med"/>
+                    </a:lnB>
+                  </a:tcPr>
+                </a:tc>
+                <a:extLst>
+                  <a:ext uri="{0D108BD9-81ED-4DB2-BD59-A6C34878D82A}">
+                    <a16:rowId xmlns:a16="http://schemas.microsoft.com/office/drawing/2014/main" val="393819864"/>
+                  </a:ext>
+                </a:extLst>
+              </a:tr>
+              <a:tr h="246326">
+                <a:tc>
+                  <a:txBody>
+                    <a:bodyPr/>
+                    <a:lstStyle/>
+                    <a:p>
+                      <a:pPr algn="l" fontAlgn="t"/>
+                      <a:r>
+                        <a:rPr lang="en-GB" sz="900" b="0" i="0" u="none" strike="noStrike">
+                          <a:solidFill>
+                            <a:srgbClr val="212529"/>
+                          </a:solidFill>
+                          <a:effectLst/>
+                          <a:latin typeface="Nunito" pitchFamily="2" charset="0"/>
+                        </a:rPr>
+                        <a:t>By partial link text</a:t>
+                      </a:r>
+                    </a:p>
+                  </a:txBody>
+                  <a:tcPr marL="7620" marR="7620" marT="7620" marB="0">
+                    <a:lnL w="6350" cap="flat" cmpd="sng" algn="ctr">
+                      <a:solidFill>
+                        <a:srgbClr val="000000"/>
+                      </a:solidFill>
+                      <a:prstDash val="solid"/>
+                      <a:round/>
+                      <a:headEnd type="none" w="med" len="med"/>
+                      <a:tailEnd type="none" w="med" len="med"/>
+                    </a:lnL>
+                    <a:lnR w="6350" cap="flat" cmpd="sng" algn="ctr">
+                      <a:solidFill>
+                        <a:srgbClr val="000000"/>
+                      </a:solidFill>
+                      <a:prstDash val="solid"/>
+                      <a:round/>
+                      <a:headEnd type="none" w="med" len="med"/>
+                      <a:tailEnd type="none" w="med" len="med"/>
+                    </a:lnR>
+                    <a:lnT w="6350" cap="flat" cmpd="sng" algn="ctr">
+                      <a:solidFill>
+                        <a:srgbClr val="000000"/>
+                      </a:solidFill>
+                      <a:prstDash val="solid"/>
+                      <a:round/>
+                      <a:headEnd type="none" w="med" len="med"/>
+                      <a:tailEnd type="none" w="med" len="med"/>
+                    </a:lnT>
+                    <a:lnB w="6350" cap="flat" cmpd="sng" algn="ctr">
+                      <a:solidFill>
+                        <a:srgbClr val="000000"/>
+                      </a:solidFill>
+                      <a:prstDash val="solid"/>
+                      <a:round/>
+                      <a:headEnd type="none" w="med" len="med"/>
+                      <a:tailEnd type="none" w="med" len="med"/>
+                    </a:lnB>
+                  </a:tcPr>
+                </a:tc>
+                <a:tc>
+                  <a:txBody>
+                    <a:bodyPr/>
+                    <a:lstStyle/>
+                    <a:p>
+                      <a:pPr algn="l" fontAlgn="t"/>
+                      <a:r>
+                        <a:rPr lang="en-GB" sz="900" b="0" i="0" u="none" strike="noStrike">
+                          <a:solidFill>
+                            <a:srgbClr val="212529"/>
+                          </a:solidFill>
+                          <a:effectLst/>
+                          <a:latin typeface="Nunito" pitchFamily="2" charset="0"/>
+                        </a:rPr>
+                        <a:t>driver.findElement(By.partialLinkText (&lt;linktext&gt;))</a:t>
+                      </a:r>
+                    </a:p>
+                  </a:txBody>
+                  <a:tcPr marL="7620" marR="7620" marT="7620" marB="0">
+                    <a:lnL w="6350" cap="flat" cmpd="sng" algn="ctr">
+                      <a:solidFill>
+                        <a:srgbClr val="000000"/>
+                      </a:solidFill>
+                      <a:prstDash val="solid"/>
+                      <a:round/>
+                      <a:headEnd type="none" w="med" len="med"/>
+                      <a:tailEnd type="none" w="med" len="med"/>
+                    </a:lnL>
+                    <a:lnR w="6350" cap="flat" cmpd="sng" algn="ctr">
+                      <a:solidFill>
+                        <a:srgbClr val="000000"/>
+                      </a:solidFill>
+                      <a:prstDash val="solid"/>
+                      <a:round/>
+                      <a:headEnd type="none" w="med" len="med"/>
+                      <a:tailEnd type="none" w="med" len="med"/>
+                    </a:lnR>
+                    <a:lnT w="6350" cap="flat" cmpd="sng" algn="ctr">
+                      <a:solidFill>
+                        <a:srgbClr val="000000"/>
+                      </a:solidFill>
+                      <a:prstDash val="solid"/>
+                      <a:round/>
+                      <a:headEnd type="none" w="med" len="med"/>
+                      <a:tailEnd type="none" w="med" len="med"/>
+                    </a:lnT>
+                    <a:lnB w="6350" cap="flat" cmpd="sng" algn="ctr">
+                      <a:solidFill>
+                        <a:srgbClr val="000000"/>
+                      </a:solidFill>
+                      <a:prstDash val="solid"/>
+                      <a:round/>
+                      <a:headEnd type="none" w="med" len="med"/>
+                      <a:tailEnd type="none" w="med" len="med"/>
+                    </a:lnB>
+                  </a:tcPr>
+                </a:tc>
+                <a:tc>
+                  <a:txBody>
+                    <a:bodyPr/>
+                    <a:lstStyle/>
+                    <a:p>
+                      <a:pPr algn="l" fontAlgn="t"/>
+                      <a:r>
+                        <a:rPr lang="en-IN" sz="900" b="0" i="0" u="none" strike="noStrike">
+                          <a:solidFill>
+                            <a:srgbClr val="212529"/>
+                          </a:solidFill>
+                          <a:effectLst/>
+                          <a:latin typeface="Nunito" pitchFamily="2" charset="0"/>
+                        </a:rPr>
+                        <a:t>Locates a link using the link's partial text</a:t>
+                      </a:r>
+                    </a:p>
+                  </a:txBody>
+                  <a:tcPr marL="7620" marR="7620" marT="7620" marB="0">
+                    <a:lnL w="6350" cap="flat" cmpd="sng" algn="ctr">
+                      <a:solidFill>
+                        <a:srgbClr val="000000"/>
+                      </a:solidFill>
+                      <a:prstDash val="solid"/>
+                      <a:round/>
+                      <a:headEnd type="none" w="med" len="med"/>
+                      <a:tailEnd type="none" w="med" len="med"/>
+                    </a:lnL>
+                    <a:lnR w="6350" cap="flat" cmpd="sng" algn="ctr">
+                      <a:solidFill>
+                        <a:srgbClr val="000000"/>
+                      </a:solidFill>
+                      <a:prstDash val="solid"/>
+                      <a:round/>
+                      <a:headEnd type="none" w="med" len="med"/>
+                      <a:tailEnd type="none" w="med" len="med"/>
+                    </a:lnR>
+                    <a:lnT w="6350" cap="flat" cmpd="sng" algn="ctr">
+                      <a:solidFill>
+                        <a:srgbClr val="000000"/>
+                      </a:solidFill>
+                      <a:prstDash val="solid"/>
+                      <a:round/>
+                      <a:headEnd type="none" w="med" len="med"/>
+                      <a:tailEnd type="none" w="med" len="med"/>
+                    </a:lnT>
+                    <a:lnB w="6350" cap="flat" cmpd="sng" algn="ctr">
+                      <a:solidFill>
+                        <a:srgbClr val="000000"/>
+                      </a:solidFill>
+                      <a:prstDash val="solid"/>
+                      <a:round/>
+                      <a:headEnd type="none" w="med" len="med"/>
+                      <a:tailEnd type="none" w="med" len="med"/>
+                    </a:lnB>
+                  </a:tcPr>
+                </a:tc>
+                <a:extLst>
+                  <a:ext uri="{0D108BD9-81ED-4DB2-BD59-A6C34878D82A}">
+                    <a16:rowId xmlns:a16="http://schemas.microsoft.com/office/drawing/2014/main" val="3527616803"/>
+                  </a:ext>
+                </a:extLst>
+              </a:tr>
+              <a:tr h="246326">
+                <a:tc>
+                  <a:txBody>
+                    <a:bodyPr/>
+                    <a:lstStyle/>
+                    <a:p>
+                      <a:pPr algn="l" fontAlgn="ctr"/>
+                      <a:r>
+                        <a:rPr lang="en-GB" sz="900" b="0" i="0" u="none" strike="noStrike">
+                          <a:solidFill>
+                            <a:srgbClr val="212529"/>
+                          </a:solidFill>
+                          <a:effectLst/>
+                          <a:latin typeface="Nunito" pitchFamily="2" charset="0"/>
+                        </a:rPr>
+                        <a:t>By CSS</a:t>
+                      </a:r>
+                    </a:p>
+                  </a:txBody>
+                  <a:tcPr marL="7620" marR="7620" marT="7620" marB="0" anchor="ctr">
+                    <a:lnL w="6350" cap="flat" cmpd="sng" algn="ctr">
+                      <a:solidFill>
+                        <a:srgbClr val="000000"/>
+                      </a:solidFill>
+                      <a:prstDash val="solid"/>
+                      <a:round/>
+                      <a:headEnd type="none" w="med" len="med"/>
+                      <a:tailEnd type="none" w="med" len="med"/>
+                    </a:lnL>
+                    <a:lnR w="6350" cap="flat" cmpd="sng" algn="ctr">
+                      <a:solidFill>
+                        <a:srgbClr val="000000"/>
+                      </a:solidFill>
+                      <a:prstDash val="solid"/>
+                      <a:round/>
+                      <a:headEnd type="none" w="med" len="med"/>
+                      <a:tailEnd type="none" w="med" len="med"/>
+                    </a:lnR>
+                    <a:lnT w="6350" cap="flat" cmpd="sng" algn="ctr">
+                      <a:solidFill>
+                        <a:srgbClr val="000000"/>
+                      </a:solidFill>
+                      <a:prstDash val="solid"/>
+                      <a:round/>
+                      <a:headEnd type="none" w="med" len="med"/>
+                      <a:tailEnd type="none" w="med" len="med"/>
+                    </a:lnT>
+                    <a:lnB w="6350" cap="flat" cmpd="sng" algn="ctr">
+                      <a:solidFill>
+                        <a:srgbClr val="000000"/>
+                      </a:solidFill>
+                      <a:prstDash val="solid"/>
+                      <a:round/>
+                      <a:headEnd type="none" w="med" len="med"/>
+                      <a:tailEnd type="none" w="med" len="med"/>
+                    </a:lnB>
+                  </a:tcPr>
+                </a:tc>
+                <a:tc>
+                  <a:txBody>
+                    <a:bodyPr/>
+                    <a:lstStyle/>
+                    <a:p>
+                      <a:pPr algn="l" fontAlgn="t"/>
+                      <a:r>
+                        <a:rPr lang="en-IN" sz="900" b="0" i="0" u="none" strike="noStrike">
+                          <a:solidFill>
+                            <a:srgbClr val="212529"/>
+                          </a:solidFill>
+                          <a:effectLst/>
+                          <a:latin typeface="Nunito" pitchFamily="2" charset="0"/>
+                        </a:rPr>
+                        <a:t>driver.findElement(By.cssSelector (&lt;css selector&gt;))</a:t>
+                      </a:r>
+                    </a:p>
+                  </a:txBody>
+                  <a:tcPr marL="7620" marR="7620" marT="7620" marB="0">
+                    <a:lnL w="6350" cap="flat" cmpd="sng" algn="ctr">
+                      <a:solidFill>
+                        <a:srgbClr val="000000"/>
+                      </a:solidFill>
+                      <a:prstDash val="solid"/>
+                      <a:round/>
+                      <a:headEnd type="none" w="med" len="med"/>
+                      <a:tailEnd type="none" w="med" len="med"/>
+                    </a:lnL>
+                    <a:lnR w="6350" cap="flat" cmpd="sng" algn="ctr">
+                      <a:solidFill>
+                        <a:srgbClr val="000000"/>
+                      </a:solidFill>
+                      <a:prstDash val="solid"/>
+                      <a:round/>
+                      <a:headEnd type="none" w="med" len="med"/>
+                      <a:tailEnd type="none" w="med" len="med"/>
+                    </a:lnR>
+                    <a:lnT w="6350" cap="flat" cmpd="sng" algn="ctr">
+                      <a:solidFill>
+                        <a:srgbClr val="000000"/>
+                      </a:solidFill>
+                      <a:prstDash val="solid"/>
+                      <a:round/>
+                      <a:headEnd type="none" w="med" len="med"/>
+                      <a:tailEnd type="none" w="med" len="med"/>
+                    </a:lnT>
+                    <a:lnB w="6350" cap="flat" cmpd="sng" algn="ctr">
+                      <a:solidFill>
+                        <a:srgbClr val="000000"/>
+                      </a:solidFill>
+                      <a:prstDash val="solid"/>
+                      <a:round/>
+                      <a:headEnd type="none" w="med" len="med"/>
+                      <a:tailEnd type="none" w="med" len="med"/>
+                    </a:lnB>
+                  </a:tcPr>
+                </a:tc>
+                <a:tc>
+                  <a:txBody>
+                    <a:bodyPr/>
+                    <a:lstStyle/>
+                    <a:p>
+                      <a:pPr algn="l" fontAlgn="t"/>
+                      <a:r>
+                        <a:rPr lang="en-IN" sz="900" b="0" i="0" u="none" strike="noStrike">
+                          <a:solidFill>
+                            <a:srgbClr val="212529"/>
+                          </a:solidFill>
+                          <a:effectLst/>
+                          <a:latin typeface="Nunito" pitchFamily="2" charset="0"/>
+                        </a:rPr>
+                        <a:t>Locates an element using the CSS selector</a:t>
+                      </a:r>
+                    </a:p>
+                  </a:txBody>
+                  <a:tcPr marL="7620" marR="7620" marT="7620" marB="0">
+                    <a:lnL w="6350" cap="flat" cmpd="sng" algn="ctr">
+                      <a:solidFill>
+                        <a:srgbClr val="000000"/>
+                      </a:solidFill>
+                      <a:prstDash val="solid"/>
+                      <a:round/>
+                      <a:headEnd type="none" w="med" len="med"/>
+                      <a:tailEnd type="none" w="med" len="med"/>
+                    </a:lnL>
+                    <a:lnR w="6350" cap="flat" cmpd="sng" algn="ctr">
+                      <a:solidFill>
+                        <a:srgbClr val="000000"/>
+                      </a:solidFill>
+                      <a:prstDash val="solid"/>
+                      <a:round/>
+                      <a:headEnd type="none" w="med" len="med"/>
+                      <a:tailEnd type="none" w="med" len="med"/>
+                    </a:lnR>
+                    <a:lnT w="6350" cap="flat" cmpd="sng" algn="ctr">
+                      <a:solidFill>
+                        <a:srgbClr val="000000"/>
+                      </a:solidFill>
+                      <a:prstDash val="solid"/>
+                      <a:round/>
+                      <a:headEnd type="none" w="med" len="med"/>
+                      <a:tailEnd type="none" w="med" len="med"/>
+                    </a:lnT>
+                    <a:lnB w="6350" cap="flat" cmpd="sng" algn="ctr">
+                      <a:solidFill>
+                        <a:srgbClr val="000000"/>
+                      </a:solidFill>
+                      <a:prstDash val="solid"/>
+                      <a:round/>
+                      <a:headEnd type="none" w="med" len="med"/>
+                      <a:tailEnd type="none" w="med" len="med"/>
+                    </a:lnB>
+                  </a:tcPr>
+                </a:tc>
+                <a:extLst>
+                  <a:ext uri="{0D108BD9-81ED-4DB2-BD59-A6C34878D82A}">
+                    <a16:rowId xmlns:a16="http://schemas.microsoft.com/office/drawing/2014/main" val="2726191971"/>
+                  </a:ext>
+                </a:extLst>
+              </a:tr>
+              <a:tr h="246326">
+                <a:tc>
+                  <a:txBody>
+                    <a:bodyPr/>
+                    <a:lstStyle/>
+                    <a:p>
+                      <a:pPr algn="l" fontAlgn="ctr"/>
+                      <a:r>
+                        <a:rPr lang="en-GB" sz="900" b="0" i="0" u="none" strike="noStrike" dirty="0">
+                          <a:solidFill>
+                            <a:srgbClr val="212529"/>
+                          </a:solidFill>
+                          <a:effectLst/>
+                          <a:latin typeface="Nunito" pitchFamily="2" charset="0"/>
+                        </a:rPr>
+                        <a:t>By XPath</a:t>
+                      </a:r>
+                    </a:p>
+                  </a:txBody>
+                  <a:tcPr marL="7620" marR="7620" marT="7620" marB="0" anchor="ctr">
+                    <a:lnL w="6350" cap="flat" cmpd="sng" algn="ctr">
+                      <a:solidFill>
+                        <a:srgbClr val="000000"/>
+                      </a:solidFill>
+                      <a:prstDash val="solid"/>
+                      <a:round/>
+                      <a:headEnd type="none" w="med" len="med"/>
+                      <a:tailEnd type="none" w="med" len="med"/>
+                    </a:lnL>
+                    <a:lnR w="6350" cap="flat" cmpd="sng" algn="ctr">
+                      <a:solidFill>
+                        <a:srgbClr val="000000"/>
+                      </a:solidFill>
+                      <a:prstDash val="solid"/>
+                      <a:round/>
+                      <a:headEnd type="none" w="med" len="med"/>
+                      <a:tailEnd type="none" w="med" len="med"/>
+                    </a:lnR>
+                    <a:lnT w="6350" cap="flat" cmpd="sng" algn="ctr">
+                      <a:solidFill>
+                        <a:srgbClr val="000000"/>
+                      </a:solidFill>
+                      <a:prstDash val="solid"/>
+                      <a:round/>
+                      <a:headEnd type="none" w="med" len="med"/>
+                      <a:tailEnd type="none" w="med" len="med"/>
+                    </a:lnT>
+                    <a:lnB w="6350" cap="flat" cmpd="sng" algn="ctr">
+                      <a:solidFill>
+                        <a:srgbClr val="000000"/>
+                      </a:solidFill>
+                      <a:prstDash val="solid"/>
+                      <a:round/>
+                      <a:headEnd type="none" w="med" len="med"/>
+                      <a:tailEnd type="none" w="med" len="med"/>
+                    </a:lnB>
+                  </a:tcPr>
+                </a:tc>
+                <a:tc>
+                  <a:txBody>
+                    <a:bodyPr/>
+                    <a:lstStyle/>
+                    <a:p>
+                      <a:pPr algn="l" fontAlgn="t"/>
+                      <a:r>
+                        <a:rPr lang="en-IN" sz="900" b="0" i="0" u="none" strike="noStrike">
+                          <a:solidFill>
+                            <a:srgbClr val="212529"/>
+                          </a:solidFill>
+                          <a:effectLst/>
+                          <a:latin typeface="Nunito" pitchFamily="2" charset="0"/>
+                        </a:rPr>
+                        <a:t>driver.findElement(By.xpath (&lt;xpath&gt;))</a:t>
+                      </a:r>
+                    </a:p>
+                  </a:txBody>
+                  <a:tcPr marL="7620" marR="7620" marT="7620" marB="0">
+                    <a:lnL w="6350" cap="flat" cmpd="sng" algn="ctr">
+                      <a:solidFill>
+                        <a:srgbClr val="000000"/>
+                      </a:solidFill>
+                      <a:prstDash val="solid"/>
+                      <a:round/>
+                      <a:headEnd type="none" w="med" len="med"/>
+                      <a:tailEnd type="none" w="med" len="med"/>
+                    </a:lnL>
+                    <a:lnR w="6350" cap="flat" cmpd="sng" algn="ctr">
+                      <a:solidFill>
+                        <a:srgbClr val="000000"/>
+                      </a:solidFill>
+                      <a:prstDash val="solid"/>
+                      <a:round/>
+                      <a:headEnd type="none" w="med" len="med"/>
+                      <a:tailEnd type="none" w="med" len="med"/>
+                    </a:lnR>
+                    <a:lnT w="6350" cap="flat" cmpd="sng" algn="ctr">
+                      <a:solidFill>
+                        <a:srgbClr val="000000"/>
+                      </a:solidFill>
+                      <a:prstDash val="solid"/>
+                      <a:round/>
+                      <a:headEnd type="none" w="med" len="med"/>
+                      <a:tailEnd type="none" w="med" len="med"/>
+                    </a:lnT>
+                    <a:lnB w="6350" cap="flat" cmpd="sng" algn="ctr">
+                      <a:solidFill>
+                        <a:srgbClr val="000000"/>
+                      </a:solidFill>
+                      <a:prstDash val="solid"/>
+                      <a:round/>
+                      <a:headEnd type="none" w="med" len="med"/>
+                      <a:tailEnd type="none" w="med" len="med"/>
+                    </a:lnB>
+                  </a:tcPr>
+                </a:tc>
+                <a:tc>
+                  <a:txBody>
+                    <a:bodyPr/>
+                    <a:lstStyle/>
+                    <a:p>
+                      <a:pPr algn="l" fontAlgn="t"/>
+                      <a:r>
+                        <a:rPr lang="en-IN" sz="900" b="0" i="0" u="none" strike="noStrike" dirty="0">
+                          <a:solidFill>
+                            <a:srgbClr val="212529"/>
+                          </a:solidFill>
+                          <a:effectLst/>
+                          <a:latin typeface="Nunito" pitchFamily="2" charset="0"/>
+                        </a:rPr>
+                        <a:t>Locates an element using XPath query</a:t>
+                      </a:r>
+                    </a:p>
+                  </a:txBody>
+                  <a:tcPr marL="7620" marR="7620" marT="7620" marB="0">
+                    <a:lnL w="6350" cap="flat" cmpd="sng" algn="ctr">
+                      <a:solidFill>
+                        <a:srgbClr val="000000"/>
+                      </a:solidFill>
+                      <a:prstDash val="solid"/>
+                      <a:round/>
+                      <a:headEnd type="none" w="med" len="med"/>
+                      <a:tailEnd type="none" w="med" len="med"/>
+                    </a:lnL>
+                    <a:lnR w="6350" cap="flat" cmpd="sng" algn="ctr">
+                      <a:solidFill>
+                        <a:srgbClr val="000000"/>
+                      </a:solidFill>
+                      <a:prstDash val="solid"/>
+                      <a:round/>
+                      <a:headEnd type="none" w="med" len="med"/>
+                      <a:tailEnd type="none" w="med" len="med"/>
+                    </a:lnR>
+                    <a:lnT w="6350" cap="flat" cmpd="sng" algn="ctr">
+                      <a:solidFill>
+                        <a:srgbClr val="000000"/>
+                      </a:solidFill>
+                      <a:prstDash val="solid"/>
+                      <a:round/>
+                      <a:headEnd type="none" w="med" len="med"/>
+                      <a:tailEnd type="none" w="med" len="med"/>
+                    </a:lnT>
+                    <a:lnB w="6350" cap="flat" cmpd="sng" algn="ctr">
+                      <a:solidFill>
+                        <a:srgbClr val="000000"/>
+                      </a:solidFill>
+                      <a:prstDash val="solid"/>
+                      <a:round/>
+                      <a:headEnd type="none" w="med" len="med"/>
+                      <a:tailEnd type="none" w="med" len="med"/>
+                    </a:lnB>
+                  </a:tcPr>
+                </a:tc>
+                <a:extLst>
+                  <a:ext uri="{0D108BD9-81ED-4DB2-BD59-A6C34878D82A}">
+                    <a16:rowId xmlns:a16="http://schemas.microsoft.com/office/drawing/2014/main" val="2837407363"/>
+                  </a:ext>
+                </a:extLst>
+              </a:tr>
+            </a:tbl>
+          </a:graphicData>
+        </a:graphic>
+      </p:graphicFrame>
+    </p:spTree>
+    <p:extLst>
+      <p:ext uri="{BB962C8B-B14F-4D97-AF65-F5344CB8AC3E}">
+        <p14:creationId xmlns:p14="http://schemas.microsoft.com/office/powerpoint/2010/main" val="2461885617"/>
       </p:ext>
     </p:extLst>
   </p:cSld>

</xml_diff>